<commit_message>
MAJ cours et guide
</commit_message>
<xml_diff>
--- a/cours/GM - Travaux pratiques.pptx
+++ b/cours/GM - Travaux pratiques.pptx
@@ -6,33 +6,36 @@
     <p:sldMasterId id="2147483666" r:id="rId2"/>
   </p:sldMasterIdLst>
   <p:notesMasterIdLst>
-    <p:notesMasterId r:id="rId27"/>
+    <p:notesMasterId r:id="rId30"/>
   </p:notesMasterIdLst>
   <p:sldIdLst>
-    <p:sldId id="256" r:id="rId3"/>
-    <p:sldId id="257" r:id="rId4"/>
-    <p:sldId id="288" r:id="rId5"/>
-    <p:sldId id="268" r:id="rId6"/>
-    <p:sldId id="269" r:id="rId7"/>
-    <p:sldId id="266" r:id="rId8"/>
-    <p:sldId id="267" r:id="rId9"/>
-    <p:sldId id="270" r:id="rId10"/>
-    <p:sldId id="276" r:id="rId11"/>
-    <p:sldId id="277" r:id="rId12"/>
-    <p:sldId id="274" r:id="rId13"/>
-    <p:sldId id="275" r:id="rId14"/>
-    <p:sldId id="283" r:id="rId15"/>
-    <p:sldId id="263" r:id="rId16"/>
-    <p:sldId id="262" r:id="rId17"/>
-    <p:sldId id="285" r:id="rId18"/>
-    <p:sldId id="260" r:id="rId19"/>
-    <p:sldId id="282" r:id="rId20"/>
-    <p:sldId id="287" r:id="rId21"/>
-    <p:sldId id="261" r:id="rId22"/>
-    <p:sldId id="290" r:id="rId23"/>
-    <p:sldId id="292" r:id="rId24"/>
-    <p:sldId id="291" r:id="rId25"/>
-    <p:sldId id="293" r:id="rId26"/>
+    <p:sldId id="297" r:id="rId3"/>
+    <p:sldId id="256" r:id="rId4"/>
+    <p:sldId id="257" r:id="rId5"/>
+    <p:sldId id="288" r:id="rId6"/>
+    <p:sldId id="268" r:id="rId7"/>
+    <p:sldId id="269" r:id="rId8"/>
+    <p:sldId id="266" r:id="rId9"/>
+    <p:sldId id="267" r:id="rId10"/>
+    <p:sldId id="270" r:id="rId11"/>
+    <p:sldId id="276" r:id="rId12"/>
+    <p:sldId id="277" r:id="rId13"/>
+    <p:sldId id="274" r:id="rId14"/>
+    <p:sldId id="275" r:id="rId15"/>
+    <p:sldId id="283" r:id="rId16"/>
+    <p:sldId id="263" r:id="rId17"/>
+    <p:sldId id="262" r:id="rId18"/>
+    <p:sldId id="285" r:id="rId19"/>
+    <p:sldId id="260" r:id="rId20"/>
+    <p:sldId id="282" r:id="rId21"/>
+    <p:sldId id="287" r:id="rId22"/>
+    <p:sldId id="261" r:id="rId23"/>
+    <p:sldId id="290" r:id="rId24"/>
+    <p:sldId id="292" r:id="rId25"/>
+    <p:sldId id="291" r:id="rId26"/>
+    <p:sldId id="293" r:id="rId27"/>
+    <p:sldId id="295" r:id="rId28"/>
+    <p:sldId id="296" r:id="rId29"/>
   </p:sldIdLst>
   <p:sldSz cx="12192000" cy="6858000"/>
   <p:notesSz cx="6858000" cy="9144000"/>
@@ -221,7 +224,7 @@
           <a:p>
             <a:fld id="{05CF0F9A-6161-450D-AD24-FE13ECDFFC91}" type="datetimeFigureOut">
               <a:rPr lang="fr-FR" smtClean="0"/>
-              <a:t>11/08/2022</a:t>
+              <a:t>06/09/2022</a:t>
             </a:fld>
             <a:endParaRPr lang="fr-FR"/>
           </a:p>
@@ -692,7 +695,7 @@
           <a:p>
             <a:fld id="{7FED9F59-E5F7-4D0D-AFB1-35ABD0360038}" type="slidenum">
               <a:rPr lang="fr-FR" smtClean="0"/>
-              <a:t>2</a:t>
+              <a:t>3</a:t>
             </a:fld>
             <a:endParaRPr lang="fr-FR"/>
           </a:p>
@@ -972,7 +975,7 @@
           <a:p>
             <a:fld id="{7FED9F59-E5F7-4D0D-AFB1-35ABD0360038}" type="slidenum">
               <a:rPr lang="fr-FR" smtClean="0"/>
-              <a:t>11</a:t>
+              <a:t>12</a:t>
             </a:fld>
             <a:endParaRPr lang="fr-FR"/>
           </a:p>
@@ -1520,7 +1523,7 @@
           <a:p>
             <a:fld id="{7FED9F59-E5F7-4D0D-AFB1-35ABD0360038}" type="slidenum">
               <a:rPr lang="fr-FR" smtClean="0"/>
-              <a:t>12</a:t>
+              <a:t>13</a:t>
             </a:fld>
             <a:endParaRPr lang="fr-FR"/>
           </a:p>
@@ -1827,7 +1830,7 @@
           <a:p>
             <a:fld id="{7FED9F59-E5F7-4D0D-AFB1-35ABD0360038}" type="slidenum">
               <a:rPr lang="fr-FR" smtClean="0"/>
-              <a:t>13</a:t>
+              <a:t>14</a:t>
             </a:fld>
             <a:endParaRPr lang="fr-FR"/>
           </a:p>
@@ -2158,7 +2161,7 @@
           <a:p>
             <a:fld id="{7FED9F59-E5F7-4D0D-AFB1-35ABD0360038}" type="slidenum">
               <a:rPr lang="fr-FR" smtClean="0"/>
-              <a:t>14</a:t>
+              <a:t>15</a:t>
             </a:fld>
             <a:endParaRPr lang="fr-FR"/>
           </a:p>
@@ -2800,7 +2803,7 @@
           <a:p>
             <a:fld id="{7FED9F59-E5F7-4D0D-AFB1-35ABD0360038}" type="slidenum">
               <a:rPr lang="fr-FR" smtClean="0"/>
-              <a:t>15</a:t>
+              <a:t>16</a:t>
             </a:fld>
             <a:endParaRPr lang="fr-FR"/>
           </a:p>
@@ -3182,7 +3185,7 @@
           <a:p>
             <a:fld id="{7FED9F59-E5F7-4D0D-AFB1-35ABD0360038}" type="slidenum">
               <a:rPr lang="fr-FR" smtClean="0"/>
-              <a:t>16</a:t>
+              <a:t>17</a:t>
             </a:fld>
             <a:endParaRPr lang="fr-FR"/>
           </a:p>
@@ -3690,7 +3693,7 @@
           <a:p>
             <a:fld id="{7FED9F59-E5F7-4D0D-AFB1-35ABD0360038}" type="slidenum">
               <a:rPr lang="fr-FR" smtClean="0"/>
-              <a:t>17</a:t>
+              <a:t>18</a:t>
             </a:fld>
             <a:endParaRPr lang="fr-FR"/>
           </a:p>
@@ -4305,7 +4308,7 @@
           <a:p>
             <a:fld id="{7FED9F59-E5F7-4D0D-AFB1-35ABD0360038}" type="slidenum">
               <a:rPr lang="fr-FR" smtClean="0"/>
-              <a:t>18</a:t>
+              <a:t>19</a:t>
             </a:fld>
             <a:endParaRPr lang="fr-FR"/>
           </a:p>
@@ -4732,7 +4735,7 @@
           <a:p>
             <a:fld id="{7FED9F59-E5F7-4D0D-AFB1-35ABD0360038}" type="slidenum">
               <a:rPr lang="fr-FR" smtClean="0"/>
-              <a:t>19</a:t>
+              <a:t>20</a:t>
             </a:fld>
             <a:endParaRPr lang="fr-FR"/>
           </a:p>
@@ -5249,7 +5252,7 @@
           <a:p>
             <a:fld id="{7FED9F59-E5F7-4D0D-AFB1-35ABD0360038}" type="slidenum">
               <a:rPr lang="fr-FR" smtClean="0"/>
-              <a:t>20</a:t>
+              <a:t>21</a:t>
             </a:fld>
             <a:endParaRPr lang="fr-FR"/>
           </a:p>
@@ -5495,7 +5498,7 @@
           <a:p>
             <a:fld id="{7FED9F59-E5F7-4D0D-AFB1-35ABD0360038}" type="slidenum">
               <a:rPr lang="fr-FR" smtClean="0"/>
-              <a:t>3</a:t>
+              <a:t>4</a:t>
             </a:fld>
             <a:endParaRPr lang="fr-FR"/>
           </a:p>
@@ -5804,11 +5807,7 @@
             </a:pPr>
             <a:r>
               <a:rPr lang="fr-FR" baseline="0" dirty="0" smtClean="0"/>
-              <a:t>Sur l</a:t>
-            </a:r>
-            <a:r>
-              <a:rPr lang="fr-FR" baseline="0" dirty="0" smtClean="0"/>
-              <a:t>a couche relais, clic droit -&gt; SELECT</a:t>
+              <a:t>Sur la couche relais, clic droit -&gt; SELECT</a:t>
             </a:r>
           </a:p>
           <a:p>
@@ -5877,7 +5876,7 @@
           <a:p>
             <a:fld id="{7FED9F59-E5F7-4D0D-AFB1-35ABD0360038}" type="slidenum">
               <a:rPr lang="fr-FR" smtClean="0"/>
-              <a:t>21</a:t>
+              <a:t>22</a:t>
             </a:fld>
             <a:endParaRPr lang="fr-FR"/>
           </a:p>
@@ -6162,7 +6161,7 @@
           <a:p>
             <a:fld id="{7FED9F59-E5F7-4D0D-AFB1-35ABD0360038}" type="slidenum">
               <a:rPr lang="fr-FR" smtClean="0"/>
-              <a:t>22</a:t>
+              <a:t>23</a:t>
             </a:fld>
             <a:endParaRPr lang="fr-FR"/>
           </a:p>
@@ -6381,7 +6380,7 @@
           <a:p>
             <a:fld id="{7FED9F59-E5F7-4D0D-AFB1-35ABD0360038}" type="slidenum">
               <a:rPr lang="fr-FR" smtClean="0"/>
-              <a:t>23</a:t>
+              <a:t>24</a:t>
             </a:fld>
             <a:endParaRPr lang="fr-FR"/>
           </a:p>
@@ -6532,7 +6531,7 @@
               <a:t>selected</a:t>
             </a:r>
             <a:r>
-              <a:rPr lang="fr-FR" baseline="0" smtClean="0"/>
+              <a:rPr lang="fr-FR" baseline="0" dirty="0" smtClean="0"/>
               <a:t> area »</a:t>
             </a:r>
             <a:endParaRPr lang="fr-FR" dirty="0"/>
@@ -6556,7 +6555,7 @@
           <a:p>
             <a:fld id="{7FED9F59-E5F7-4D0D-AFB1-35ABD0360038}" type="slidenum">
               <a:rPr lang="fr-FR" smtClean="0"/>
-              <a:t>24</a:t>
+              <a:t>25</a:t>
             </a:fld>
             <a:endParaRPr lang="fr-FR"/>
           </a:p>
@@ -6566,6 +6565,490 @@
     <p:extLst>
       <p:ext uri="{BB962C8B-B14F-4D97-AF65-F5344CB8AC3E}">
         <p14:creationId xmlns:p14="http://schemas.microsoft.com/office/powerpoint/2010/main" val="411802914"/>
+      </p:ext>
+    </p:extLst>
+  </p:cSld>
+  <p:clrMapOvr>
+    <a:masterClrMapping/>
+  </p:clrMapOvr>
+</p:notes>
+</file>
+
+<file path=ppt/notesSlides/notesSlide24.xml><?xml version="1.0" encoding="utf-8"?>
+<p:notes xmlns:a="http://schemas.openxmlformats.org/drawingml/2006/main" xmlns:r="http://schemas.openxmlformats.org/officeDocument/2006/relationships" xmlns:p="http://schemas.openxmlformats.org/presentationml/2006/main">
+  <p:cSld>
+    <p:spTree>
+      <p:nvGrpSpPr>
+        <p:cNvPr id="1" name=""/>
+        <p:cNvGrpSpPr/>
+        <p:nvPr/>
+      </p:nvGrpSpPr>
+      <p:grpSpPr>
+        <a:xfrm>
+          <a:off x="0" y="0"/>
+          <a:ext cx="0" cy="0"/>
+          <a:chOff x="0" y="0"/>
+          <a:chExt cx="0" cy="0"/>
+        </a:xfrm>
+      </p:grpSpPr>
+      <p:sp>
+        <p:nvSpPr>
+          <p:cNvPr id="2" name="Espace réservé de l'image des diapositives 1"/>
+          <p:cNvSpPr>
+            <a:spLocks noGrp="1" noRot="1" noChangeAspect="1"/>
+          </p:cNvSpPr>
+          <p:nvPr>
+            <p:ph type="sldImg"/>
+          </p:nvPr>
+        </p:nvSpPr>
+        <p:spPr/>
+      </p:sp>
+      <p:sp>
+        <p:nvSpPr>
+          <p:cNvPr id="3" name="Espace réservé des commentaires 2"/>
+          <p:cNvSpPr>
+            <a:spLocks noGrp="1"/>
+          </p:cNvSpPr>
+          <p:nvPr>
+            <p:ph type="body" idx="1"/>
+          </p:nvPr>
+        </p:nvSpPr>
+        <p:spPr/>
+        <p:txBody>
+          <a:bodyPr/>
+          <a:lstStyle/>
+          <a:p>
+            <a:pPr marL="228600" indent="-228600">
+              <a:buAutoNum type="arabicParenR"/>
+            </a:pPr>
+            <a:r>
+              <a:rPr lang="fr-FR" baseline="0" dirty="0" smtClean="0"/>
+              <a:t>Etude de densité</a:t>
+            </a:r>
+          </a:p>
+          <a:p>
+            <a:pPr marL="685800" lvl="1" indent="-228600">
+              <a:buAutoNum type="arabicParenR"/>
+            </a:pPr>
+            <a:r>
+              <a:rPr lang="fr-FR" baseline="0" dirty="0" smtClean="0"/>
+              <a:t>Sur la couche trajets, clic droit -&gt; SELECT</a:t>
+            </a:r>
+          </a:p>
+          <a:p>
+            <a:pPr marL="685800" lvl="1" indent="-228600">
+              <a:buAutoNum type="arabicParenR"/>
+            </a:pPr>
+            <a:r>
+              <a:rPr lang="fr-FR" baseline="0" dirty="0" smtClean="0"/>
+              <a:t>Sur la carte clic droit -&gt; Advanced </a:t>
+            </a:r>
+            <a:r>
+              <a:rPr lang="fr-FR" baseline="0" dirty="0" err="1" smtClean="0"/>
+              <a:t>feature</a:t>
+            </a:r>
+            <a:r>
+              <a:rPr lang="fr-FR" baseline="0" dirty="0" smtClean="0"/>
+              <a:t> </a:t>
+            </a:r>
+            <a:r>
+              <a:rPr lang="fr-FR" baseline="0" dirty="0" err="1" smtClean="0"/>
+              <a:t>creation</a:t>
+            </a:r>
+            <a:r>
+              <a:rPr lang="fr-FR" baseline="0" dirty="0" smtClean="0"/>
+              <a:t> options -&gt; </a:t>
+            </a:r>
+            <a:r>
+              <a:rPr lang="fr-FR" baseline="0" dirty="0" err="1" smtClean="0"/>
+              <a:t>create</a:t>
+            </a:r>
+            <a:r>
+              <a:rPr lang="fr-FR" baseline="0" dirty="0" smtClean="0"/>
+              <a:t> point </a:t>
+            </a:r>
+            <a:r>
+              <a:rPr lang="fr-FR" baseline="0" dirty="0" err="1" smtClean="0"/>
+              <a:t>features</a:t>
+            </a:r>
+            <a:r>
+              <a:rPr lang="fr-FR" baseline="0" dirty="0" smtClean="0"/>
+              <a:t> </a:t>
+            </a:r>
+            <a:r>
+              <a:rPr lang="fr-FR" baseline="0" dirty="0" err="1" smtClean="0"/>
+              <a:t>spaced</a:t>
+            </a:r>
+            <a:r>
+              <a:rPr lang="fr-FR" baseline="0" dirty="0" smtClean="0"/>
+              <a:t> </a:t>
+            </a:r>
+            <a:r>
+              <a:rPr lang="fr-FR" baseline="0" dirty="0" err="1" smtClean="0"/>
+              <a:t>along</a:t>
+            </a:r>
+            <a:r>
+              <a:rPr lang="fr-FR" baseline="0" dirty="0" smtClean="0"/>
+              <a:t>..</a:t>
+            </a:r>
+          </a:p>
+          <a:p>
+            <a:pPr marL="685800" lvl="1" indent="-228600">
+              <a:buAutoNum type="arabicParenR"/>
+            </a:pPr>
+            <a:r>
+              <a:rPr lang="fr-FR" baseline="0" dirty="0" smtClean="0"/>
+              <a:t>Sélectionner « </a:t>
+            </a:r>
+            <a:r>
+              <a:rPr lang="fr-FR" baseline="0" dirty="0" err="1" smtClean="0"/>
+              <a:t>Sample</a:t>
+            </a:r>
+            <a:r>
+              <a:rPr lang="fr-FR" baseline="0" dirty="0" smtClean="0"/>
+              <a:t> </a:t>
+            </a:r>
+            <a:r>
+              <a:rPr lang="fr-FR" baseline="0" dirty="0" err="1" smtClean="0"/>
+              <a:t>features</a:t>
+            </a:r>
+            <a:r>
+              <a:rPr lang="fr-FR" baseline="0" dirty="0" smtClean="0"/>
+              <a:t> </a:t>
+            </a:r>
+            <a:r>
+              <a:rPr lang="fr-FR" baseline="0" dirty="0" err="1" smtClean="0"/>
+              <a:t>at</a:t>
+            </a:r>
+            <a:r>
+              <a:rPr lang="fr-FR" baseline="0" dirty="0" smtClean="0"/>
+              <a:t> </a:t>
+            </a:r>
+            <a:r>
+              <a:rPr lang="fr-FR" baseline="0" dirty="0" err="1" smtClean="0"/>
+              <a:t>fixed</a:t>
+            </a:r>
+            <a:r>
+              <a:rPr lang="fr-FR" baseline="0" dirty="0" smtClean="0"/>
+              <a:t> distance </a:t>
+            </a:r>
+            <a:r>
+              <a:rPr lang="fr-FR" baseline="0" dirty="0" err="1" smtClean="0"/>
+              <a:t>interval</a:t>
+            </a:r>
+            <a:r>
+              <a:rPr lang="fr-FR" baseline="0" dirty="0" smtClean="0"/>
+              <a:t> »</a:t>
+            </a:r>
+          </a:p>
+          <a:p>
+            <a:pPr marL="685800" lvl="1" indent="-228600">
+              <a:buAutoNum type="arabicParenR"/>
+            </a:pPr>
+            <a:r>
+              <a:rPr lang="fr-FR" baseline="0" dirty="0" smtClean="0"/>
+              <a:t>Indiquer une valeur de 50-100 m</a:t>
+            </a:r>
+          </a:p>
+          <a:p>
+            <a:pPr marL="685800" lvl="1" indent="-228600">
+              <a:buAutoNum type="arabicParenR"/>
+            </a:pPr>
+            <a:r>
+              <a:rPr lang="fr-FR" baseline="0" dirty="0" smtClean="0"/>
+              <a:t>Sur la nouvelle couche, clic droit -&gt; </a:t>
+            </a:r>
+            <a:r>
+              <a:rPr lang="fr-FR" baseline="0" dirty="0" err="1" smtClean="0"/>
+              <a:t>Analysis</a:t>
+            </a:r>
+            <a:r>
+              <a:rPr lang="fr-FR" baseline="0" dirty="0" smtClean="0"/>
+              <a:t> -&gt; DENSITY</a:t>
+            </a:r>
+          </a:p>
+          <a:p>
+            <a:pPr marL="685800" lvl="1" indent="-228600">
+              <a:buAutoNum type="arabicParenR"/>
+            </a:pPr>
+            <a:r>
+              <a:rPr lang="fr-FR" baseline="0" dirty="0" smtClean="0"/>
+              <a:t>Laissez les paramètres par défaut</a:t>
+            </a:r>
+          </a:p>
+          <a:p>
+            <a:pPr marL="685800" lvl="1" indent="-228600">
+              <a:buAutoNum type="arabicParenR"/>
+            </a:pPr>
+            <a:r>
+              <a:rPr lang="fr-FR" baseline="0" dirty="0" smtClean="0"/>
+              <a:t>Masquer les couches trajets et points</a:t>
+            </a:r>
+          </a:p>
+          <a:p>
+            <a:pPr marL="685800" lvl="1" indent="-228600">
+              <a:buAutoNum type="arabicParenR"/>
+            </a:pPr>
+            <a:endParaRPr lang="fr-FR" baseline="0" dirty="0" smtClean="0"/>
+          </a:p>
+          <a:p>
+            <a:pPr marL="228600" lvl="0" indent="-228600">
+              <a:buAutoNum type="arabicParenR"/>
+            </a:pPr>
+            <a:r>
+              <a:rPr lang="fr-FR" baseline="0" dirty="0" smtClean="0"/>
+              <a:t>Diagramme</a:t>
+            </a:r>
+          </a:p>
+          <a:p>
+            <a:pPr marL="685800" lvl="1" indent="-228600">
+              <a:buAutoNum type="arabicParenR"/>
+            </a:pPr>
+            <a:r>
+              <a:rPr lang="fr-FR" baseline="0" dirty="0" smtClean="0"/>
+              <a:t>Menu </a:t>
+            </a:r>
+            <a:r>
+              <a:rPr lang="fr-FR" baseline="0" dirty="0" err="1" smtClean="0"/>
+              <a:t>Analysis</a:t>
+            </a:r>
+            <a:r>
+              <a:rPr lang="fr-FR" baseline="0" dirty="0" smtClean="0"/>
+              <a:t> -&gt; </a:t>
+            </a:r>
+            <a:r>
+              <a:rPr lang="fr-FR" baseline="0" dirty="0" err="1" smtClean="0"/>
+              <a:t>Create</a:t>
+            </a:r>
+            <a:r>
+              <a:rPr lang="fr-FR" baseline="0" dirty="0" smtClean="0"/>
+              <a:t> </a:t>
+            </a:r>
+            <a:r>
+              <a:rPr lang="fr-FR" baseline="0" dirty="0" err="1" smtClean="0"/>
+              <a:t>Voronoi</a:t>
+            </a:r>
+            <a:r>
+              <a:rPr lang="fr-FR" baseline="0" dirty="0" smtClean="0"/>
+              <a:t>/</a:t>
+            </a:r>
+            <a:r>
+              <a:rPr lang="fr-FR" baseline="0" dirty="0" err="1" smtClean="0"/>
+              <a:t>Thiessen</a:t>
+            </a:r>
+            <a:r>
+              <a:rPr lang="fr-FR" baseline="0" dirty="0" smtClean="0"/>
+              <a:t> </a:t>
+            </a:r>
+            <a:r>
+              <a:rPr lang="fr-FR" baseline="0" dirty="0" err="1" smtClean="0"/>
+              <a:t>diagram</a:t>
+            </a:r>
+            <a:endParaRPr lang="fr-FR" dirty="0"/>
+          </a:p>
+        </p:txBody>
+      </p:sp>
+      <p:sp>
+        <p:nvSpPr>
+          <p:cNvPr id="4" name="Espace réservé du numéro de diapositive 3"/>
+          <p:cNvSpPr>
+            <a:spLocks noGrp="1"/>
+          </p:cNvSpPr>
+          <p:nvPr>
+            <p:ph type="sldNum" sz="quarter" idx="10"/>
+          </p:nvPr>
+        </p:nvSpPr>
+        <p:spPr/>
+        <p:txBody>
+          <a:bodyPr/>
+          <a:lstStyle/>
+          <a:p>
+            <a:fld id="{7FED9F59-E5F7-4D0D-AFB1-35ABD0360038}" type="slidenum">
+              <a:rPr lang="fr-FR" smtClean="0"/>
+              <a:t>26</a:t>
+            </a:fld>
+            <a:endParaRPr lang="fr-FR"/>
+          </a:p>
+        </p:txBody>
+      </p:sp>
+    </p:spTree>
+    <p:extLst>
+      <p:ext uri="{BB962C8B-B14F-4D97-AF65-F5344CB8AC3E}">
+        <p14:creationId xmlns:p14="http://schemas.microsoft.com/office/powerpoint/2010/main" val="2261096632"/>
+      </p:ext>
+    </p:extLst>
+  </p:cSld>
+  <p:clrMapOvr>
+    <a:masterClrMapping/>
+  </p:clrMapOvr>
+</p:notes>
+</file>
+
+<file path=ppt/notesSlides/notesSlide25.xml><?xml version="1.0" encoding="utf-8"?>
+<p:notes xmlns:a="http://schemas.openxmlformats.org/drawingml/2006/main" xmlns:r="http://schemas.openxmlformats.org/officeDocument/2006/relationships" xmlns:p="http://schemas.openxmlformats.org/presentationml/2006/main">
+  <p:cSld>
+    <p:spTree>
+      <p:nvGrpSpPr>
+        <p:cNvPr id="1" name=""/>
+        <p:cNvGrpSpPr/>
+        <p:nvPr/>
+      </p:nvGrpSpPr>
+      <p:grpSpPr>
+        <a:xfrm>
+          <a:off x="0" y="0"/>
+          <a:ext cx="0" cy="0"/>
+          <a:chOff x="0" y="0"/>
+          <a:chExt cx="0" cy="0"/>
+        </a:xfrm>
+      </p:grpSpPr>
+      <p:sp>
+        <p:nvSpPr>
+          <p:cNvPr id="2" name="Espace réservé de l'image des diapositives 1"/>
+          <p:cNvSpPr>
+            <a:spLocks noGrp="1" noRot="1" noChangeAspect="1"/>
+          </p:cNvSpPr>
+          <p:nvPr>
+            <p:ph type="sldImg"/>
+          </p:nvPr>
+        </p:nvSpPr>
+        <p:spPr/>
+      </p:sp>
+      <p:sp>
+        <p:nvSpPr>
+          <p:cNvPr id="3" name="Espace réservé des commentaires 2"/>
+          <p:cNvSpPr>
+            <a:spLocks noGrp="1"/>
+          </p:cNvSpPr>
+          <p:nvPr>
+            <p:ph type="body" idx="1"/>
+          </p:nvPr>
+        </p:nvSpPr>
+        <p:spPr/>
+        <p:txBody>
+          <a:bodyPr/>
+          <a:lstStyle/>
+          <a:p>
+            <a:pPr marL="228600" indent="-228600">
+              <a:buAutoNum type="arabicParenR"/>
+            </a:pPr>
+            <a:r>
+              <a:rPr lang="fr-FR" dirty="0" smtClean="0"/>
+              <a:t>Transformer la trace en ligne</a:t>
+            </a:r>
+          </a:p>
+          <a:p>
+            <a:pPr marL="685800" lvl="1" indent="-228600">
+              <a:buAutoNum type="arabicParenR"/>
+            </a:pPr>
+            <a:r>
+              <a:rPr lang="fr-FR" dirty="0" smtClean="0"/>
+              <a:t>Sur la couche trace</a:t>
+            </a:r>
+            <a:r>
+              <a:rPr lang="fr-FR" baseline="0" dirty="0" smtClean="0"/>
+              <a:t> GPS, clic droit -&gt; SELECT</a:t>
+            </a:r>
+          </a:p>
+          <a:p>
+            <a:pPr marL="685800" lvl="1" indent="-228600">
+              <a:buAutoNum type="arabicParenR"/>
+            </a:pPr>
+            <a:r>
+              <a:rPr lang="fr-FR" baseline="0" dirty="0" smtClean="0"/>
+              <a:t>Sur la carte, clic droit -&gt; </a:t>
+            </a:r>
+            <a:r>
+              <a:rPr lang="fr-FR" baseline="0" dirty="0" err="1" smtClean="0"/>
+              <a:t>Create</a:t>
+            </a:r>
+            <a:r>
+              <a:rPr lang="fr-FR" baseline="0" dirty="0" smtClean="0"/>
+              <a:t> line </a:t>
+            </a:r>
+            <a:r>
+              <a:rPr lang="fr-FR" baseline="0" dirty="0" err="1" smtClean="0"/>
+              <a:t>feature</a:t>
+            </a:r>
+            <a:r>
+              <a:rPr lang="fr-FR" baseline="0" dirty="0" smtClean="0"/>
+              <a:t> -&gt; </a:t>
+            </a:r>
+            <a:r>
+              <a:rPr lang="fr-FR" baseline="0" dirty="0" err="1" smtClean="0"/>
+              <a:t>create</a:t>
+            </a:r>
+            <a:r>
+              <a:rPr lang="fr-FR" baseline="0" dirty="0" smtClean="0"/>
+              <a:t> new line </a:t>
+            </a:r>
+            <a:r>
+              <a:rPr lang="fr-FR" baseline="0" dirty="0" err="1" smtClean="0"/>
+              <a:t>feature</a:t>
+            </a:r>
+            <a:r>
+              <a:rPr lang="fr-FR" baseline="0" dirty="0" smtClean="0"/>
+              <a:t> </a:t>
+            </a:r>
+            <a:r>
+              <a:rPr lang="fr-FR" baseline="0" dirty="0" err="1" smtClean="0"/>
+              <a:t>from</a:t>
+            </a:r>
+            <a:r>
+              <a:rPr lang="fr-FR" baseline="0" dirty="0" smtClean="0"/>
+              <a:t> </a:t>
+            </a:r>
+            <a:r>
+              <a:rPr lang="fr-FR" baseline="0" dirty="0" err="1" smtClean="0"/>
+              <a:t>selected</a:t>
+            </a:r>
+            <a:r>
+              <a:rPr lang="fr-FR" baseline="0" dirty="0" smtClean="0"/>
+              <a:t> points</a:t>
+            </a:r>
+          </a:p>
+          <a:p>
+            <a:pPr marL="685800" lvl="1" indent="-228600">
+              <a:buAutoNum type="arabicParenR"/>
+            </a:pPr>
+            <a:r>
+              <a:rPr lang="fr-FR" baseline="0" dirty="0" smtClean="0"/>
+              <a:t>Spécifier une distance maximale de 500-600 </a:t>
+            </a:r>
+            <a:r>
+              <a:rPr lang="fr-FR" baseline="0" smtClean="0"/>
+              <a:t>metres</a:t>
+            </a:r>
+            <a:endParaRPr lang="fr-FR" dirty="0"/>
+          </a:p>
+        </p:txBody>
+      </p:sp>
+      <p:sp>
+        <p:nvSpPr>
+          <p:cNvPr id="4" name="Espace réservé du numéro de diapositive 3"/>
+          <p:cNvSpPr>
+            <a:spLocks noGrp="1"/>
+          </p:cNvSpPr>
+          <p:nvPr>
+            <p:ph type="sldNum" sz="quarter" idx="10"/>
+          </p:nvPr>
+        </p:nvSpPr>
+        <p:spPr/>
+        <p:txBody>
+          <a:bodyPr/>
+          <a:lstStyle/>
+          <a:p>
+            <a:fld id="{7FED9F59-E5F7-4D0D-AFB1-35ABD0360038}" type="slidenum">
+              <a:rPr lang="fr-FR" smtClean="0"/>
+              <a:t>27</a:t>
+            </a:fld>
+            <a:endParaRPr lang="fr-FR"/>
+          </a:p>
+        </p:txBody>
+      </p:sp>
+    </p:spTree>
+    <p:extLst>
+      <p:ext uri="{BB962C8B-B14F-4D97-AF65-F5344CB8AC3E}">
+        <p14:creationId xmlns:p14="http://schemas.microsoft.com/office/powerpoint/2010/main" val="493818057"/>
       </p:ext>
     </p:extLst>
   </p:cSld>
@@ -6823,7 +7306,7 @@
           <a:p>
             <a:fld id="{7FED9F59-E5F7-4D0D-AFB1-35ABD0360038}" type="slidenum">
               <a:rPr lang="fr-FR" smtClean="0"/>
-              <a:t>4</a:t>
+              <a:t>5</a:t>
             </a:fld>
             <a:endParaRPr lang="fr-FR"/>
           </a:p>
@@ -7037,7 +7520,7 @@
           <a:p>
             <a:fld id="{7FED9F59-E5F7-4D0D-AFB1-35ABD0360038}" type="slidenum">
               <a:rPr lang="fr-FR" smtClean="0"/>
-              <a:t>5</a:t>
+              <a:t>6</a:t>
             </a:fld>
             <a:endParaRPr lang="fr-FR"/>
           </a:p>
@@ -7285,7 +7768,7 @@
           <a:p>
             <a:fld id="{7FED9F59-E5F7-4D0D-AFB1-35ABD0360038}" type="slidenum">
               <a:rPr lang="fr-FR" smtClean="0"/>
-              <a:t>6</a:t>
+              <a:t>7</a:t>
             </a:fld>
             <a:endParaRPr lang="fr-FR"/>
           </a:p>
@@ -7676,7 +8159,7 @@
           <a:p>
             <a:fld id="{7FED9F59-E5F7-4D0D-AFB1-35ABD0360038}" type="slidenum">
               <a:rPr lang="fr-FR" smtClean="0"/>
-              <a:t>7</a:t>
+              <a:t>8</a:t>
             </a:fld>
             <a:endParaRPr lang="fr-FR"/>
           </a:p>
@@ -7918,7 +8401,7 @@
           <a:p>
             <a:fld id="{7FED9F59-E5F7-4D0D-AFB1-35ABD0360038}" type="slidenum">
               <a:rPr lang="fr-FR" smtClean="0"/>
-              <a:t>8</a:t>
+              <a:t>9</a:t>
             </a:fld>
             <a:endParaRPr lang="fr-FR"/>
           </a:p>
@@ -8197,7 +8680,7 @@
           <a:p>
             <a:fld id="{7FED9F59-E5F7-4D0D-AFB1-35ABD0360038}" type="slidenum">
               <a:rPr lang="fr-FR" smtClean="0"/>
-              <a:t>9</a:t>
+              <a:t>10</a:t>
             </a:fld>
             <a:endParaRPr lang="fr-FR"/>
           </a:p>
@@ -8538,7 +9021,7 @@
           <a:p>
             <a:fld id="{7FED9F59-E5F7-4D0D-AFB1-35ABD0360038}" type="slidenum">
               <a:rPr lang="fr-FR" smtClean="0"/>
-              <a:t>10</a:t>
+              <a:t>11</a:t>
             </a:fld>
             <a:endParaRPr lang="fr-FR"/>
           </a:p>
@@ -8694,7 +9177,7 @@
           <a:p>
             <a:fld id="{A74F3EA5-292C-4331-BAB5-A6575F471254}" type="datetimeFigureOut">
               <a:rPr lang="fr-FR" smtClean="0"/>
-              <a:t>11/08/2022</a:t>
+              <a:t>06/09/2022</a:t>
             </a:fld>
             <a:endParaRPr lang="fr-FR"/>
           </a:p>
@@ -8880,7 +9363,7 @@
           <a:p>
             <a:fld id="{A74F3EA5-292C-4331-BAB5-A6575F471254}" type="datetimeFigureOut">
               <a:rPr lang="fr-FR" smtClean="0"/>
-              <a:t>11/08/2022</a:t>
+              <a:t>06/09/2022</a:t>
             </a:fld>
             <a:endParaRPr lang="fr-FR"/>
           </a:p>
@@ -9066,7 +9549,7 @@
           <a:p>
             <a:fld id="{A74F3EA5-292C-4331-BAB5-A6575F471254}" type="datetimeFigureOut">
               <a:rPr lang="fr-FR" smtClean="0"/>
-              <a:t>11/08/2022</a:t>
+              <a:t>06/09/2022</a:t>
             </a:fld>
             <a:endParaRPr lang="fr-FR"/>
           </a:p>
@@ -9258,7 +9741,7 @@
           <a:p>
             <a:fld id="{A74F3EA5-292C-4331-BAB5-A6575F471254}" type="datetimeFigureOut">
               <a:rPr lang="fr-FR" smtClean="0"/>
-              <a:t>11/08/2022</a:t>
+              <a:t>06/09/2022</a:t>
             </a:fld>
             <a:endParaRPr lang="fr-FR"/>
           </a:p>
@@ -9428,7 +9911,7 @@
           <a:p>
             <a:fld id="{A74F3EA5-292C-4331-BAB5-A6575F471254}" type="datetimeFigureOut">
               <a:rPr lang="fr-FR" smtClean="0"/>
-              <a:t>11/08/2022</a:t>
+              <a:t>06/09/2022</a:t>
             </a:fld>
             <a:endParaRPr lang="fr-FR"/>
           </a:p>
@@ -9674,7 +10157,7 @@
           <a:p>
             <a:fld id="{A74F3EA5-292C-4331-BAB5-A6575F471254}" type="datetimeFigureOut">
               <a:rPr lang="fr-FR" smtClean="0"/>
-              <a:t>11/08/2022</a:t>
+              <a:t>06/09/2022</a:t>
             </a:fld>
             <a:endParaRPr lang="fr-FR"/>
           </a:p>
@@ -9906,7 +10389,7 @@
           <a:p>
             <a:fld id="{A74F3EA5-292C-4331-BAB5-A6575F471254}" type="datetimeFigureOut">
               <a:rPr lang="fr-FR" smtClean="0"/>
-              <a:t>11/08/2022</a:t>
+              <a:t>06/09/2022</a:t>
             </a:fld>
             <a:endParaRPr lang="fr-FR"/>
           </a:p>
@@ -10273,7 +10756,7 @@
           <a:p>
             <a:fld id="{A74F3EA5-292C-4331-BAB5-A6575F471254}" type="datetimeFigureOut">
               <a:rPr lang="fr-FR" smtClean="0"/>
-              <a:t>11/08/2022</a:t>
+              <a:t>06/09/2022</a:t>
             </a:fld>
             <a:endParaRPr lang="fr-FR"/>
           </a:p>
@@ -10391,7 +10874,7 @@
           <a:p>
             <a:fld id="{A74F3EA5-292C-4331-BAB5-A6575F471254}" type="datetimeFigureOut">
               <a:rPr lang="fr-FR" smtClean="0"/>
-              <a:t>11/08/2022</a:t>
+              <a:t>06/09/2022</a:t>
             </a:fld>
             <a:endParaRPr lang="fr-FR"/>
           </a:p>
@@ -10486,7 +10969,7 @@
           <a:p>
             <a:fld id="{A74F3EA5-292C-4331-BAB5-A6575F471254}" type="datetimeFigureOut">
               <a:rPr lang="fr-FR" smtClean="0"/>
-              <a:t>11/08/2022</a:t>
+              <a:t>06/09/2022</a:t>
             </a:fld>
             <a:endParaRPr lang="fr-FR"/>
           </a:p>
@@ -10763,7 +11246,7 @@
           <a:p>
             <a:fld id="{A74F3EA5-292C-4331-BAB5-A6575F471254}" type="datetimeFigureOut">
               <a:rPr lang="fr-FR" smtClean="0"/>
-              <a:t>11/08/2022</a:t>
+              <a:t>06/09/2022</a:t>
             </a:fld>
             <a:endParaRPr lang="fr-FR"/>
           </a:p>
@@ -10949,7 +11432,7 @@
           <a:p>
             <a:fld id="{A74F3EA5-292C-4331-BAB5-A6575F471254}" type="datetimeFigureOut">
               <a:rPr lang="fr-FR" smtClean="0"/>
-              <a:t>11/08/2022</a:t>
+              <a:t>06/09/2022</a:t>
             </a:fld>
             <a:endParaRPr lang="fr-FR"/>
           </a:p>
@@ -11206,7 +11689,7 @@
           <a:p>
             <a:fld id="{A74F3EA5-292C-4331-BAB5-A6575F471254}" type="datetimeFigureOut">
               <a:rPr lang="fr-FR" smtClean="0"/>
-              <a:t>11/08/2022</a:t>
+              <a:t>06/09/2022</a:t>
             </a:fld>
             <a:endParaRPr lang="fr-FR"/>
           </a:p>
@@ -11376,7 +11859,7 @@
           <a:p>
             <a:fld id="{A74F3EA5-292C-4331-BAB5-A6575F471254}" type="datetimeFigureOut">
               <a:rPr lang="fr-FR" smtClean="0"/>
-              <a:t>11/08/2022</a:t>
+              <a:t>06/09/2022</a:t>
             </a:fld>
             <a:endParaRPr lang="fr-FR"/>
           </a:p>
@@ -11556,7 +12039,7 @@
           <a:p>
             <a:fld id="{A74F3EA5-292C-4331-BAB5-A6575F471254}" type="datetimeFigureOut">
               <a:rPr lang="fr-FR" smtClean="0"/>
-              <a:t>11/08/2022</a:t>
+              <a:t>06/09/2022</a:t>
             </a:fld>
             <a:endParaRPr lang="fr-FR"/>
           </a:p>
@@ -11808,7 +12291,7 @@
           <a:p>
             <a:fld id="{A74F3EA5-292C-4331-BAB5-A6575F471254}" type="datetimeFigureOut">
               <a:rPr lang="fr-FR" smtClean="0"/>
-              <a:t>11/08/2022</a:t>
+              <a:t>06/09/2022</a:t>
             </a:fld>
             <a:endParaRPr lang="fr-FR"/>
           </a:p>
@@ -12054,7 +12537,7 @@
           <a:p>
             <a:fld id="{A74F3EA5-292C-4331-BAB5-A6575F471254}" type="datetimeFigureOut">
               <a:rPr lang="fr-FR" smtClean="0"/>
-              <a:t>11/08/2022</a:t>
+              <a:t>06/09/2022</a:t>
             </a:fld>
             <a:endParaRPr lang="fr-FR"/>
           </a:p>
@@ -12436,7 +12919,7 @@
           <a:p>
             <a:fld id="{A74F3EA5-292C-4331-BAB5-A6575F471254}" type="datetimeFigureOut">
               <a:rPr lang="fr-FR" smtClean="0"/>
-              <a:t>11/08/2022</a:t>
+              <a:t>06/09/2022</a:t>
             </a:fld>
             <a:endParaRPr lang="fr-FR"/>
           </a:p>
@@ -12562,7 +13045,7 @@
           <a:p>
             <a:fld id="{A74F3EA5-292C-4331-BAB5-A6575F471254}" type="datetimeFigureOut">
               <a:rPr lang="fr-FR" smtClean="0"/>
-              <a:t>11/08/2022</a:t>
+              <a:t>06/09/2022</a:t>
             </a:fld>
             <a:endParaRPr lang="fr-FR"/>
           </a:p>
@@ -12657,7 +13140,7 @@
           <a:p>
             <a:fld id="{A74F3EA5-292C-4331-BAB5-A6575F471254}" type="datetimeFigureOut">
               <a:rPr lang="fr-FR" smtClean="0"/>
-              <a:t>11/08/2022</a:t>
+              <a:t>06/09/2022</a:t>
             </a:fld>
             <a:endParaRPr lang="fr-FR"/>
           </a:p>
@@ -12943,7 +13426,7 @@
           <a:p>
             <a:fld id="{A74F3EA5-292C-4331-BAB5-A6575F471254}" type="datetimeFigureOut">
               <a:rPr lang="fr-FR" smtClean="0"/>
-              <a:t>11/08/2022</a:t>
+              <a:t>06/09/2022</a:t>
             </a:fld>
             <a:endParaRPr lang="fr-FR"/>
           </a:p>
@@ -13205,7 +13688,7 @@
           <a:p>
             <a:fld id="{A74F3EA5-292C-4331-BAB5-A6575F471254}" type="datetimeFigureOut">
               <a:rPr lang="fr-FR" smtClean="0"/>
-              <a:t>11/08/2022</a:t>
+              <a:t>06/09/2022</a:t>
             </a:fld>
             <a:endParaRPr lang="fr-FR"/>
           </a:p>
@@ -13323,7 +13806,7 @@
           <a:p>
             <a:fld id="{A74F3EA5-292C-4331-BAB5-A6575F471254}" type="datetimeFigureOut">
               <a:rPr lang="fr-FR" smtClean="0"/>
-              <a:t>11/08/2022</a:t>
+              <a:t>06/09/2022</a:t>
             </a:fld>
             <a:endParaRPr lang="fr-FR"/>
           </a:p>
@@ -14163,7 +14646,7 @@
           <a:p>
             <a:fld id="{A74F3EA5-292C-4331-BAB5-A6575F471254}" type="datetimeFigureOut">
               <a:rPr lang="fr-FR" smtClean="0"/>
-              <a:t>11/08/2022</a:t>
+              <a:t>06/09/2022</a:t>
             </a:fld>
             <a:endParaRPr lang="fr-FR"/>
           </a:p>
@@ -14870,12 +15353,12 @@
       </p:grpSpPr>
       <p:sp>
         <p:nvSpPr>
-          <p:cNvPr id="2" name="Titre 1"/>
-          <p:cNvSpPr>
-            <a:spLocks noGrp="1"/>
-          </p:cNvSpPr>
-          <p:nvPr>
-            <p:ph type="ctrTitle"/>
+          <p:cNvPr id="4" name="Titre 3"/>
+          <p:cNvSpPr>
+            <a:spLocks noGrp="1"/>
+          </p:cNvSpPr>
+          <p:nvPr>
+            <p:ph type="title"/>
           </p:nvPr>
         </p:nvSpPr>
         <p:spPr/>
@@ -14883,22 +15366,18 @@
           <a:bodyPr/>
           <a:lstStyle/>
           <a:p>
-            <a:r>
-              <a:rPr lang="fr-FR" dirty="0" smtClean="0"/>
-              <a:t>Global Mapper</a:t>
-            </a:r>
-            <a:endParaRPr lang="fr-FR" dirty="0"/>
-          </a:p>
-        </p:txBody>
-      </p:sp>
-      <p:sp>
-        <p:nvSpPr>
-          <p:cNvPr id="3" name="Sous-titre 2"/>
-          <p:cNvSpPr>
-            <a:spLocks noGrp="1"/>
-          </p:cNvSpPr>
-          <p:nvPr>
-            <p:ph type="subTitle" idx="1"/>
+            <a:endParaRPr lang="fr-FR"/>
+          </a:p>
+        </p:txBody>
+      </p:sp>
+      <p:sp>
+        <p:nvSpPr>
+          <p:cNvPr id="5" name="Espace réservé du contenu 4"/>
+          <p:cNvSpPr>
+            <a:spLocks noGrp="1"/>
+          </p:cNvSpPr>
+          <p:nvPr>
+            <p:ph idx="1"/>
           </p:nvPr>
         </p:nvSpPr>
         <p:spPr/>
@@ -14908,7 +15387,107 @@
           <a:p>
             <a:r>
               <a:rPr lang="fr-FR" dirty="0" smtClean="0"/>
-              <a:t>Exercices pratiques</a:t>
+              <a:t>Exo 1 : import + enregistrement GMW</a:t>
+            </a:r>
+          </a:p>
+          <a:p>
+            <a:r>
+              <a:rPr lang="fr-FR" dirty="0" smtClean="0"/>
+              <a:t>Exo 2 : export</a:t>
+            </a:r>
+          </a:p>
+          <a:p>
+            <a:r>
+              <a:rPr lang="fr-FR" dirty="0" smtClean="0"/>
+              <a:t>Exo 3 : outils divers (recherche simple, vue, mesure, </a:t>
+            </a:r>
+            <a:r>
+              <a:rPr lang="fr-FR" dirty="0" err="1" smtClean="0"/>
+              <a:t>etc</a:t>
+            </a:r>
+            <a:r>
+              <a:rPr lang="fr-FR" dirty="0" smtClean="0"/>
+              <a:t>)</a:t>
+            </a:r>
+          </a:p>
+          <a:p>
+            <a:r>
+              <a:rPr lang="fr-FR" dirty="0" smtClean="0"/>
+              <a:t>Exo 4 : dessin vecteur + enregistrement GMP</a:t>
+            </a:r>
+          </a:p>
+          <a:p>
+            <a:r>
+              <a:rPr lang="fr-FR" dirty="0" smtClean="0"/>
+              <a:t>Exo 5 : modification vecteurs</a:t>
+            </a:r>
+            <a:endParaRPr lang="fr-FR" dirty="0"/>
+          </a:p>
+          <a:p>
+            <a:r>
+              <a:rPr lang="fr-FR" dirty="0" smtClean="0"/>
+              <a:t>Exo 6 : relief</a:t>
+            </a:r>
+          </a:p>
+          <a:p>
+            <a:r>
+              <a:rPr lang="fr-FR" dirty="0" smtClean="0"/>
+              <a:t>Exo 7 : import TXT / CSV</a:t>
+            </a:r>
+          </a:p>
+          <a:p>
+            <a:r>
+              <a:rPr lang="fr-FR" dirty="0" smtClean="0"/>
+              <a:t>Exo 8 : import symbole personnalisé, style de point, style de surface</a:t>
+            </a:r>
+          </a:p>
+          <a:p>
+            <a:r>
+              <a:rPr lang="fr-FR" dirty="0"/>
+              <a:t>Exo </a:t>
+            </a:r>
+            <a:r>
+              <a:rPr lang="fr-FR" dirty="0" smtClean="0"/>
+              <a:t>9 </a:t>
+            </a:r>
+            <a:r>
+              <a:rPr lang="fr-FR" dirty="0"/>
+              <a:t>: dessin vecteur + enregistrement GMP</a:t>
+            </a:r>
+          </a:p>
+          <a:p>
+            <a:r>
+              <a:rPr lang="fr-FR" dirty="0"/>
+              <a:t>Exo </a:t>
+            </a:r>
+            <a:r>
+              <a:rPr lang="fr-FR" dirty="0" smtClean="0"/>
+              <a:t>10 </a:t>
+            </a:r>
+            <a:r>
+              <a:rPr lang="fr-FR" dirty="0"/>
+              <a:t>: modification vecteurs</a:t>
+            </a:r>
+          </a:p>
+          <a:p>
+            <a:r>
+              <a:rPr lang="fr-FR" dirty="0" smtClean="0"/>
+              <a:t>Exo 11: </a:t>
+            </a:r>
+          </a:p>
+          <a:p>
+            <a:endParaRPr lang="fr-FR" dirty="0" smtClean="0"/>
+          </a:p>
+          <a:p>
+            <a:r>
+              <a:rPr lang="fr-FR" dirty="0" smtClean="0"/>
+              <a:t>BDD GONIO</a:t>
+            </a:r>
+          </a:p>
+          <a:p>
+            <a:r>
+              <a:rPr lang="fr-FR" dirty="0" smtClean="0"/>
+              <a:t>Exo 8 : Analyse (densité, nb de points)</a:t>
             </a:r>
             <a:endParaRPr lang="fr-FR" dirty="0"/>
           </a:p>
@@ -14917,7 +15496,7 @@
     </p:spTree>
     <p:extLst>
       <p:ext uri="{BB962C8B-B14F-4D97-AF65-F5344CB8AC3E}">
-        <p14:creationId xmlns:p14="http://schemas.microsoft.com/office/powerpoint/2010/main" val="4189460078"/>
+        <p14:creationId xmlns:p14="http://schemas.microsoft.com/office/powerpoint/2010/main" val="2372685503"/>
       </p:ext>
     </p:extLst>
   </p:cSld>
@@ -14961,7 +15540,7 @@
           <a:p>
             <a:r>
               <a:rPr lang="fr-FR" dirty="0" smtClean="0"/>
-              <a:t>Exercice 4</a:t>
+              <a:t>Exercice 3</a:t>
             </a:r>
             <a:endParaRPr lang="fr-FR" dirty="0"/>
           </a:p>
@@ -14979,72 +15558,95 @@
         </p:nvSpPr>
         <p:spPr/>
         <p:txBody>
-          <a:bodyPr/>
+          <a:bodyPr>
+            <a:normAutofit/>
+          </a:bodyPr>
           <a:lstStyle/>
           <a:p>
             <a:r>
               <a:rPr lang="fr-FR" dirty="0" smtClean="0"/>
-              <a:t>Importer </a:t>
-            </a:r>
-            <a:r>
-              <a:rPr lang="fr-FR" b="1" dirty="0" err="1" smtClean="0"/>
-              <a:t>exo_base.gmw</a:t>
-            </a:r>
-            <a:endParaRPr lang="fr-FR" b="1" dirty="0" smtClean="0"/>
-          </a:p>
-          <a:p>
-            <a:endParaRPr lang="fr-FR" dirty="0"/>
-          </a:p>
-          <a:p>
-            <a:r>
-              <a:rPr lang="fr-FR" dirty="0" smtClean="0"/>
-              <a:t>Importer les fichier</a:t>
+              <a:t>Exporter la couche alsace2.tif</a:t>
             </a:r>
           </a:p>
           <a:p>
             <a:pPr lvl="1"/>
             <a:r>
               <a:rPr lang="fr-FR" dirty="0" smtClean="0"/>
-              <a:t>Carte : </a:t>
+              <a:t>Format GEOTIFF</a:t>
+            </a:r>
+          </a:p>
+          <a:p>
+            <a:pPr lvl="1"/>
+            <a:r>
+              <a:rPr lang="fr-FR" dirty="0" smtClean="0"/>
+              <a:t>Exporter les données visibles à l’écran</a:t>
+            </a:r>
+          </a:p>
+          <a:p>
+            <a:pPr lvl="1"/>
+            <a:r>
+              <a:rPr lang="fr-FR" dirty="0" smtClean="0"/>
+              <a:t>Sous le nom « </a:t>
             </a:r>
             <a:r>
               <a:rPr lang="fr-FR" b="1" dirty="0" err="1" smtClean="0"/>
               <a:t>Printzheim.tif</a:t>
             </a:r>
-            <a:endParaRPr lang="fr-FR" b="1" dirty="0" smtClean="0"/>
+            <a:r>
+              <a:rPr lang="fr-FR" dirty="0" smtClean="0"/>
+              <a:t> »</a:t>
+            </a:r>
           </a:p>
           <a:p>
             <a:pPr lvl="1"/>
-            <a:r>
-              <a:rPr lang="fr-FR" dirty="0" smtClean="0"/>
-              <a:t>Relief : </a:t>
+            <a:endParaRPr lang="fr-FR" dirty="0"/>
+          </a:p>
+          <a:p>
+            <a:r>
+              <a:rPr lang="fr-FR" dirty="0" smtClean="0"/>
+              <a:t>Répéter la procédure pour les données relief</a:t>
+            </a:r>
+          </a:p>
+          <a:p>
+            <a:pPr lvl="1"/>
+            <a:r>
+              <a:rPr lang="fr-FR" dirty="0" smtClean="0"/>
+              <a:t>Exporter vers </a:t>
             </a:r>
             <a:r>
               <a:rPr lang="fr-FR" b="1" dirty="0" err="1" smtClean="0"/>
               <a:t>Printzheim_relief.tif</a:t>
             </a:r>
+            <a:endParaRPr lang="fr-FR" b="1" dirty="0" smtClean="0"/>
+          </a:p>
+          <a:p>
+            <a:pPr lvl="1"/>
             <a:endParaRPr lang="fr-FR" b="1" dirty="0"/>
           </a:p>
           <a:p>
+            <a:r>
+              <a:rPr lang="fr-FR" dirty="0"/>
+              <a:t>Enregistrer l’espace de travail </a:t>
+            </a:r>
+            <a:r>
+              <a:rPr lang="fr-FR" b="1" dirty="0" smtClean="0"/>
+              <a:t>exo3.gmw</a:t>
+            </a:r>
+            <a:endParaRPr lang="fr-FR" dirty="0"/>
+          </a:p>
+          <a:p>
+            <a:pPr lvl="1"/>
             <a:endParaRPr lang="fr-FR" b="1" dirty="0" smtClean="0"/>
           </a:p>
           <a:p>
-            <a:r>
-              <a:rPr lang="fr-FR" dirty="0" smtClean="0"/>
-              <a:t>Exporter </a:t>
-            </a:r>
-            <a:r>
-              <a:rPr lang="fr-FR" b="1" dirty="0" err="1" smtClean="0"/>
-              <a:t>Printzheim.tif</a:t>
-            </a:r>
-            <a:r>
-              <a:rPr lang="fr-FR" dirty="0" smtClean="0"/>
-              <a:t> en 5x5 tuiles</a:t>
-            </a:r>
+            <a:pPr lvl="1"/>
             <a:endParaRPr lang="fr-FR" dirty="0"/>
           </a:p>
           <a:p>
-            <a:pPr marL="457200" lvl="1" indent="0">
+            <a:endParaRPr lang="fr-FR" dirty="0" smtClean="0"/>
+          </a:p>
+          <a:p>
+            <a:pPr marL="0" indent="0">
               <a:buNone/>
             </a:pPr>
             <a:endParaRPr lang="fr-FR" dirty="0"/>
@@ -15054,7 +15656,7 @@
     </p:spTree>
     <p:extLst>
       <p:ext uri="{BB962C8B-B14F-4D97-AF65-F5344CB8AC3E}">
-        <p14:creationId xmlns:p14="http://schemas.microsoft.com/office/powerpoint/2010/main" val="1066168593"/>
+        <p14:creationId xmlns:p14="http://schemas.microsoft.com/office/powerpoint/2010/main" val="3127763321"/>
       </p:ext>
     </p:extLst>
   </p:cSld>
@@ -15116,29 +15718,18 @@
         </p:nvSpPr>
         <p:spPr/>
         <p:txBody>
-          <a:bodyPr>
-            <a:normAutofit/>
-          </a:bodyPr>
+          <a:bodyPr/>
           <a:lstStyle/>
           <a:p>
             <a:r>
               <a:rPr lang="fr-FR" dirty="0" smtClean="0"/>
-              <a:t>Trouver le point côté 228 à l’ouest de </a:t>
-            </a:r>
-            <a:r>
-              <a:rPr lang="fr-FR" dirty="0" err="1" smtClean="0"/>
-              <a:t>Printzheim</a:t>
-            </a:r>
-            <a:endParaRPr lang="fr-FR" dirty="0" smtClean="0"/>
-          </a:p>
-          <a:p>
-            <a:endParaRPr lang="fr-FR" dirty="0" smtClean="0"/>
-          </a:p>
-          <a:p>
-            <a:r>
-              <a:rPr lang="fr-FR" dirty="0" smtClean="0"/>
-              <a:t>Placer ici un point nommé « SAEB 1 »</a:t>
-            </a:r>
+              <a:t>Importer </a:t>
+            </a:r>
+            <a:r>
+              <a:rPr lang="fr-FR" b="1" dirty="0" err="1" smtClean="0"/>
+              <a:t>exo_base.gmw</a:t>
+            </a:r>
+            <a:endParaRPr lang="fr-FR" b="1" dirty="0" smtClean="0"/>
           </a:p>
           <a:p>
             <a:endParaRPr lang="fr-FR" dirty="0"/>
@@ -15146,21 +15737,53 @@
           <a:p>
             <a:r>
               <a:rPr lang="fr-FR" dirty="0" smtClean="0"/>
-              <a:t>En partant de ce point, mesurer une distance de 2,3km, azimut 244° pour localiser un croisement en T</a:t>
-            </a:r>
-          </a:p>
-          <a:p>
+              <a:t>Importer les fichier</a:t>
+            </a:r>
+          </a:p>
+          <a:p>
+            <a:pPr lvl="1"/>
+            <a:r>
+              <a:rPr lang="fr-FR" dirty="0" smtClean="0"/>
+              <a:t>Carte : </a:t>
+            </a:r>
+            <a:r>
+              <a:rPr lang="fr-FR" b="1" dirty="0" err="1" smtClean="0"/>
+              <a:t>Printzheim.tif</a:t>
+            </a:r>
+            <a:endParaRPr lang="fr-FR" b="1" dirty="0" smtClean="0"/>
+          </a:p>
+          <a:p>
+            <a:pPr lvl="1"/>
+            <a:r>
+              <a:rPr lang="fr-FR" dirty="0" smtClean="0"/>
+              <a:t>Relief : </a:t>
+            </a:r>
+            <a:r>
+              <a:rPr lang="fr-FR" b="1" dirty="0" err="1" smtClean="0"/>
+              <a:t>Printzheim_relief.tif</a:t>
+            </a:r>
+            <a:endParaRPr lang="fr-FR" b="1" dirty="0"/>
+          </a:p>
+          <a:p>
+            <a:endParaRPr lang="fr-FR" b="1" dirty="0" smtClean="0"/>
+          </a:p>
+          <a:p>
+            <a:r>
+              <a:rPr lang="fr-FR" dirty="0" smtClean="0"/>
+              <a:t>Exporter </a:t>
+            </a:r>
+            <a:r>
+              <a:rPr lang="fr-FR" b="1" dirty="0" err="1" smtClean="0"/>
+              <a:t>Printzheim.tif</a:t>
+            </a:r>
+            <a:r>
+              <a:rPr lang="fr-FR" dirty="0" smtClean="0"/>
+              <a:t> en 5x5 tuiles</a:t>
+            </a:r>
             <a:endParaRPr lang="fr-FR" dirty="0"/>
           </a:p>
           <a:p>
-            <a:r>
-              <a:rPr lang="fr-FR" dirty="0" smtClean="0"/>
-              <a:t>Dessiner une ellipse sur ce croisement</a:t>
-            </a:r>
-            <a:endParaRPr lang="fr-FR" dirty="0"/>
-          </a:p>
-          <a:p>
-            <a:pPr marL="0" indent="0">
+            <a:pPr marL="457200" lvl="1" indent="0">
               <a:buNone/>
             </a:pPr>
             <a:endParaRPr lang="fr-FR" dirty="0"/>
@@ -15170,7 +15793,7 @@
     </p:spTree>
     <p:extLst>
       <p:ext uri="{BB962C8B-B14F-4D97-AF65-F5344CB8AC3E}">
-        <p14:creationId xmlns:p14="http://schemas.microsoft.com/office/powerpoint/2010/main" val="4102292299"/>
+        <p14:creationId xmlns:p14="http://schemas.microsoft.com/office/powerpoint/2010/main" val="1066168593"/>
       </p:ext>
     </p:extLst>
   </p:cSld>
@@ -15238,71 +15861,47 @@
           <a:lstStyle/>
           <a:p>
             <a:r>
-              <a:rPr lang="fr-FR" dirty="0"/>
-              <a:t>Depuis le point </a:t>
-            </a:r>
-            <a:r>
-              <a:rPr lang="fr-FR" dirty="0" smtClean="0"/>
-              <a:t>SAEB 1, créer </a:t>
-            </a:r>
-            <a:r>
-              <a:rPr lang="fr-FR" dirty="0"/>
-              <a:t>une zone tampon </a:t>
-            </a:r>
-            <a:r>
-              <a:rPr lang="fr-FR" dirty="0" smtClean="0"/>
-              <a:t>d’1km</a:t>
-            </a:r>
-          </a:p>
-          <a:p>
-            <a:r>
-              <a:rPr lang="fr-FR" dirty="0" smtClean="0"/>
-              <a:t>Depuis le point SAEB 1, calculer l’</a:t>
+              <a:rPr lang="fr-FR" dirty="0" smtClean="0"/>
+              <a:t>Trouver le point côté 228 à l’ouest de </a:t>
             </a:r>
             <a:r>
               <a:rPr lang="fr-FR" dirty="0" err="1" smtClean="0"/>
-              <a:t>intervisibilité</a:t>
-            </a:r>
-            <a:r>
-              <a:rPr lang="fr-FR" dirty="0" smtClean="0"/>
-              <a:t> sur 3km</a:t>
-            </a:r>
+              <a:t>Printzheim</a:t>
+            </a:r>
+            <a:endParaRPr lang="fr-FR" dirty="0" smtClean="0"/>
+          </a:p>
+          <a:p>
+            <a:endParaRPr lang="fr-FR" dirty="0" smtClean="0"/>
+          </a:p>
+          <a:p>
+            <a:r>
+              <a:rPr lang="fr-FR" dirty="0" smtClean="0"/>
+              <a:t>Placer ici un point nommé « SAEB 1 »</a:t>
+            </a:r>
+          </a:p>
+          <a:p>
             <a:endParaRPr lang="fr-FR" dirty="0"/>
           </a:p>
           <a:p>
+            <a:r>
+              <a:rPr lang="fr-FR" dirty="0" smtClean="0"/>
+              <a:t>En partant de ce point, mesurer une distance de 2,3km, azimut 244° pour localiser un croisement en T</a:t>
+            </a:r>
+          </a:p>
+          <a:p>
+            <a:endParaRPr lang="fr-FR" dirty="0"/>
+          </a:p>
+          <a:p>
+            <a:r>
+              <a:rPr lang="fr-FR" dirty="0" smtClean="0"/>
+              <a:t>Dessiner une ellipse sur ce croisement</a:t>
+            </a:r>
+            <a:endParaRPr lang="fr-FR" dirty="0"/>
+          </a:p>
+          <a:p>
             <a:pPr marL="0" indent="0">
               <a:buNone/>
             </a:pPr>
-            <a:endParaRPr lang="fr-FR" dirty="0"/>
-          </a:p>
-          <a:p>
-            <a:r>
-              <a:rPr lang="fr-FR" dirty="0" smtClean="0"/>
-              <a:t>Créer le style de point « VAB » avec le symbole VAB</a:t>
-            </a:r>
-          </a:p>
-          <a:p>
-            <a:endParaRPr lang="fr-FR" dirty="0"/>
-          </a:p>
-          <a:p>
-            <a:r>
-              <a:rPr lang="fr-FR" dirty="0" smtClean="0"/>
-              <a:t>Définir le point « SAEB 1» comme étant de type VAB</a:t>
-            </a:r>
-            <a:endParaRPr lang="fr-FR" dirty="0"/>
-          </a:p>
-          <a:p>
-            <a:endParaRPr lang="fr-FR" dirty="0"/>
-          </a:p>
-          <a:p>
-            <a:r>
-              <a:rPr lang="fr-FR" dirty="0"/>
-              <a:t>Enregistrer l’espace de travail </a:t>
-            </a:r>
-            <a:r>
-              <a:rPr lang="fr-FR" b="1" dirty="0" smtClean="0"/>
-              <a:t>exo4_Printzheim.gmw</a:t>
-            </a:r>
             <a:endParaRPr lang="fr-FR" dirty="0"/>
           </a:p>
         </p:txBody>
@@ -15310,7 +15909,7 @@
     </p:spTree>
     <p:extLst>
       <p:ext uri="{BB962C8B-B14F-4D97-AF65-F5344CB8AC3E}">
-        <p14:creationId xmlns:p14="http://schemas.microsoft.com/office/powerpoint/2010/main" val="365335706"/>
+        <p14:creationId xmlns:p14="http://schemas.microsoft.com/office/powerpoint/2010/main" val="4102292299"/>
       </p:ext>
     </p:extLst>
   </p:cSld>
@@ -15339,7 +15938,7 @@
       </p:grpSpPr>
       <p:sp>
         <p:nvSpPr>
-          <p:cNvPr id="5" name="Titre 1"/>
+          <p:cNvPr id="2" name="Titre 1"/>
           <p:cNvSpPr>
             <a:spLocks noGrp="1"/>
           </p:cNvSpPr>
@@ -15354,7 +15953,7 @@
           <a:p>
             <a:r>
               <a:rPr lang="fr-FR" dirty="0" smtClean="0"/>
-              <a:t>Exercice 5</a:t>
+              <a:t>Exercice 4</a:t>
             </a:r>
             <a:endParaRPr lang="fr-FR" dirty="0"/>
           </a:p>
@@ -15373,106 +15972,84 @@
         <p:spPr/>
         <p:txBody>
           <a:bodyPr>
-            <a:normAutofit fontScale="92500" lnSpcReduction="20000"/>
+            <a:normAutofit/>
           </a:bodyPr>
           <a:lstStyle/>
           <a:p>
             <a:r>
-              <a:rPr lang="fr-FR" dirty="0" smtClean="0"/>
-              <a:t>Ouvrir </a:t>
+              <a:rPr lang="fr-FR" dirty="0"/>
+              <a:t>Depuis le point </a:t>
+            </a:r>
+            <a:r>
+              <a:rPr lang="fr-FR" dirty="0" smtClean="0"/>
+              <a:t>SAEB 1, créer </a:t>
+            </a:r>
+            <a:r>
+              <a:rPr lang="fr-FR" dirty="0"/>
+              <a:t>une zone tampon </a:t>
+            </a:r>
+            <a:r>
+              <a:rPr lang="fr-FR" dirty="0" smtClean="0"/>
+              <a:t>d’1km</a:t>
+            </a:r>
+          </a:p>
+          <a:p>
+            <a:r>
+              <a:rPr lang="fr-FR" dirty="0" smtClean="0"/>
+              <a:t>Depuis le point SAEB 1, calculer l’</a:t>
+            </a:r>
+            <a:r>
+              <a:rPr lang="fr-FR" dirty="0" err="1" smtClean="0"/>
+              <a:t>intervisibilité</a:t>
+            </a:r>
+            <a:r>
+              <a:rPr lang="fr-FR" dirty="0" smtClean="0"/>
+              <a:t> sur 3km</a:t>
+            </a:r>
+            <a:endParaRPr lang="fr-FR" dirty="0"/>
+          </a:p>
+          <a:p>
+            <a:pPr marL="0" indent="0">
+              <a:buNone/>
+            </a:pPr>
+            <a:endParaRPr lang="fr-FR" dirty="0"/>
+          </a:p>
+          <a:p>
+            <a:r>
+              <a:rPr lang="fr-FR" dirty="0" smtClean="0"/>
+              <a:t>Créer le style de point « VAB » avec le symbole VAB</a:t>
+            </a:r>
+          </a:p>
+          <a:p>
+            <a:endParaRPr lang="fr-FR" dirty="0"/>
+          </a:p>
+          <a:p>
+            <a:r>
+              <a:rPr lang="fr-FR" dirty="0" smtClean="0"/>
+              <a:t>Définir le point « SAEB 1» comme étant de type VAB</a:t>
+            </a:r>
+            <a:endParaRPr lang="fr-FR" dirty="0"/>
+          </a:p>
+          <a:p>
+            <a:endParaRPr lang="fr-FR" dirty="0"/>
+          </a:p>
+          <a:p>
+            <a:r>
+              <a:rPr lang="fr-FR" dirty="0"/>
+              <a:t>Enregistrer l’espace de travail </a:t>
             </a:r>
             <a:r>
               <a:rPr lang="fr-FR" b="1" dirty="0" smtClean="0"/>
-              <a:t>exo4_printzheim.gmw</a:t>
-            </a:r>
-            <a:r>
-              <a:rPr lang="fr-FR" dirty="0" smtClean="0"/>
-              <a:t>, centrer la vue sur </a:t>
-            </a:r>
-            <a:r>
-              <a:rPr lang="fr-FR" b="1" dirty="0" err="1" smtClean="0"/>
-              <a:t>Printzheim</a:t>
-            </a:r>
-            <a:endParaRPr lang="fr-FR" b="1" dirty="0"/>
-          </a:p>
-          <a:p>
-            <a:endParaRPr lang="fr-FR" dirty="0" smtClean="0"/>
-          </a:p>
-          <a:p>
-            <a:r>
-              <a:rPr lang="fr-FR" dirty="0" smtClean="0"/>
-              <a:t>Créer un style de surface Territoire ENI</a:t>
-            </a:r>
-          </a:p>
-          <a:p>
-            <a:pPr lvl="1"/>
-            <a:r>
-              <a:rPr lang="fr-FR" dirty="0" smtClean="0"/>
-              <a:t>Remplissage en rayures rouges</a:t>
-            </a:r>
-          </a:p>
-          <a:p>
-            <a:pPr lvl="1"/>
-            <a:r>
-              <a:rPr lang="fr-FR" dirty="0" smtClean="0"/>
-              <a:t>Délimiter en rouge sombre</a:t>
-            </a:r>
-          </a:p>
-          <a:p>
+              <a:t>exo4_Printzheim.gmw</a:t>
+            </a:r>
             <a:endParaRPr lang="fr-FR" dirty="0"/>
-          </a:p>
-          <a:p>
-            <a:r>
-              <a:rPr lang="fr-FR" dirty="0" smtClean="0"/>
-              <a:t>Créer un territoire ENI autour de </a:t>
-            </a:r>
-            <a:r>
-              <a:rPr lang="fr-FR" b="1" dirty="0" err="1" smtClean="0"/>
-              <a:t>Imbsheim</a:t>
-            </a:r>
-            <a:endParaRPr lang="fr-FR" dirty="0"/>
-          </a:p>
-          <a:p>
-            <a:r>
-              <a:rPr lang="fr-FR" dirty="0" smtClean="0"/>
-              <a:t>Modifier le territoire ENI pour englober </a:t>
-            </a:r>
-            <a:r>
-              <a:rPr lang="fr-FR" b="1" dirty="0" err="1" smtClean="0"/>
-              <a:t>Riedheim</a:t>
-            </a:r>
-            <a:endParaRPr lang="fr-FR" b="1" dirty="0" smtClean="0"/>
-          </a:p>
-          <a:p>
-            <a:endParaRPr lang="fr-FR" dirty="0"/>
-          </a:p>
-          <a:p>
-            <a:r>
-              <a:rPr lang="fr-FR" dirty="0" smtClean="0"/>
-              <a:t>Tracer une FLOT entre </a:t>
-            </a:r>
-            <a:r>
-              <a:rPr lang="fr-FR" b="1" dirty="0" err="1" smtClean="0"/>
-              <a:t>Printzheim</a:t>
-            </a:r>
-            <a:r>
-              <a:rPr lang="fr-FR" dirty="0" smtClean="0"/>
-              <a:t> et ce territoire ENI</a:t>
-            </a:r>
-          </a:p>
-          <a:p>
-            <a:pPr lvl="1"/>
-            <a:r>
-              <a:rPr lang="fr-FR" dirty="0" smtClean="0"/>
-              <a:t>Tirets jaunes, épaisseur de 3 pixels</a:t>
-            </a:r>
           </a:p>
         </p:txBody>
       </p:sp>
     </p:spTree>
     <p:extLst>
       <p:ext uri="{BB962C8B-B14F-4D97-AF65-F5344CB8AC3E}">
-        <p14:creationId xmlns:p14="http://schemas.microsoft.com/office/powerpoint/2010/main" val="3448961259"/>
+        <p14:creationId xmlns:p14="http://schemas.microsoft.com/office/powerpoint/2010/main" val="365335706"/>
       </p:ext>
     </p:extLst>
   </p:cSld>
@@ -15501,7 +16078,7 @@
       </p:grpSpPr>
       <p:sp>
         <p:nvSpPr>
-          <p:cNvPr id="2" name="Titre 1"/>
+          <p:cNvPr id="5" name="Titre 1"/>
           <p:cNvSpPr>
             <a:spLocks noGrp="1"/>
           </p:cNvSpPr>
@@ -15535,114 +16112,98 @@
         <p:spPr/>
         <p:txBody>
           <a:bodyPr>
-            <a:normAutofit/>
+            <a:normAutofit fontScale="92500" lnSpcReduction="20000"/>
           </a:bodyPr>
           <a:lstStyle/>
           <a:p>
-            <a:pPr hangingPunct="0">
-              <a:spcBef>
-                <a:spcPts val="0"/>
-              </a:spcBef>
-            </a:pPr>
-            <a:r>
-              <a:rPr lang="fr-FR" dirty="0" smtClean="0"/>
-              <a:t>Dans </a:t>
-            </a:r>
-            <a:r>
-              <a:rPr lang="fr-FR" dirty="0"/>
-              <a:t>le secteur d’</a:t>
-            </a:r>
-            <a:r>
-              <a:rPr lang="fr-FR" i="1" dirty="0"/>
-              <a:t>Haguenau</a:t>
-            </a:r>
-            <a:r>
-              <a:rPr lang="fr-FR" dirty="0"/>
-              <a:t>, créer </a:t>
-            </a:r>
-            <a:r>
-              <a:rPr lang="fr-FR" dirty="0" smtClean="0"/>
-              <a:t>deux surfaces</a:t>
-            </a:r>
+            <a:r>
+              <a:rPr lang="fr-FR" dirty="0" smtClean="0"/>
+              <a:t>Ouvrir </a:t>
+            </a:r>
+            <a:r>
+              <a:rPr lang="fr-FR" b="1" dirty="0" smtClean="0"/>
+              <a:t>exo4_printzheim.gmw</a:t>
+            </a:r>
+            <a:r>
+              <a:rPr lang="fr-FR" dirty="0" smtClean="0"/>
+              <a:t>, centrer la vue sur </a:t>
+            </a:r>
+            <a:r>
+              <a:rPr lang="fr-FR" b="1" dirty="0" err="1" smtClean="0"/>
+              <a:t>Printzheim</a:t>
+            </a:r>
+            <a:endParaRPr lang="fr-FR" b="1" dirty="0"/>
+          </a:p>
+          <a:p>
+            <a:endParaRPr lang="fr-FR" dirty="0" smtClean="0"/>
+          </a:p>
+          <a:p>
+            <a:r>
+              <a:rPr lang="fr-FR" dirty="0" smtClean="0"/>
+              <a:t>Créer un style de surface Territoire ENI</a:t>
+            </a:r>
+          </a:p>
+          <a:p>
+            <a:pPr lvl="1"/>
+            <a:r>
+              <a:rPr lang="fr-FR" dirty="0" smtClean="0"/>
+              <a:t>Remplissage en rayures rouges</a:t>
+            </a:r>
+          </a:p>
+          <a:p>
+            <a:pPr lvl="1"/>
+            <a:r>
+              <a:rPr lang="fr-FR" dirty="0" smtClean="0"/>
+              <a:t>Délimiter en rouge sombre</a:t>
+            </a:r>
+          </a:p>
+          <a:p>
             <a:endParaRPr lang="fr-FR" dirty="0"/>
           </a:p>
           <a:p>
-            <a:pPr lvl="1" hangingPunct="0">
-              <a:spcBef>
-                <a:spcPts val="0"/>
-              </a:spcBef>
-            </a:pPr>
-            <a:r>
-              <a:rPr lang="fr-FR" dirty="0"/>
-              <a:t>Le camp </a:t>
-            </a:r>
-            <a:r>
-              <a:rPr lang="fr-FR" dirty="0" smtClean="0"/>
-              <a:t>d’</a:t>
-            </a:r>
-            <a:r>
-              <a:rPr lang="fr-FR" dirty="0" err="1" smtClean="0"/>
-              <a:t>Oberhoffen</a:t>
-            </a:r>
-            <a:r>
-              <a:rPr lang="fr-FR" dirty="0" smtClean="0"/>
-              <a:t> (zone de manœuvre)</a:t>
+            <a:r>
+              <a:rPr lang="fr-FR" dirty="0" smtClean="0"/>
+              <a:t>Créer un territoire ENI autour de </a:t>
+            </a:r>
+            <a:r>
+              <a:rPr lang="fr-FR" b="1" dirty="0" err="1" smtClean="0"/>
+              <a:t>Imbsheim</a:t>
             </a:r>
             <a:endParaRPr lang="fr-FR" dirty="0"/>
           </a:p>
           <a:p>
-            <a:pPr lvl="1" hangingPunct="0">
-              <a:spcBef>
-                <a:spcPts val="0"/>
-              </a:spcBef>
-            </a:pPr>
-            <a:r>
-              <a:rPr lang="fr-FR" dirty="0"/>
-              <a:t>Le quartier </a:t>
-            </a:r>
-            <a:r>
-              <a:rPr lang="fr-FR" dirty="0" smtClean="0"/>
-              <a:t>Estienne (bâtiments)</a:t>
-            </a:r>
+            <a:r>
+              <a:rPr lang="fr-FR" dirty="0" smtClean="0"/>
+              <a:t>Modifier le territoire ENI pour englober </a:t>
+            </a:r>
+            <a:r>
+              <a:rPr lang="fr-FR" b="1" dirty="0" err="1" smtClean="0"/>
+              <a:t>Riedheim</a:t>
+            </a:r>
+            <a:endParaRPr lang="fr-FR" b="1" dirty="0" smtClean="0"/>
+          </a:p>
+          <a:p>
             <a:endParaRPr lang="fr-FR" dirty="0"/>
           </a:p>
           <a:p>
-            <a:pPr marL="0" indent="0" hangingPunct="0">
-              <a:spcBef>
-                <a:spcPts val="0"/>
-              </a:spcBef>
-              <a:buNone/>
-            </a:pPr>
-            <a:endParaRPr lang="fr-FR" dirty="0"/>
-          </a:p>
-          <a:p>
-            <a:pPr hangingPunct="0">
-              <a:spcBef>
-                <a:spcPts val="0"/>
-              </a:spcBef>
-            </a:pPr>
-            <a:r>
-              <a:rPr lang="fr-FR" dirty="0" smtClean="0"/>
-              <a:t>Fusionner les deux zones</a:t>
-            </a:r>
-          </a:p>
-          <a:p>
-            <a:pPr hangingPunct="0">
-              <a:spcBef>
-                <a:spcPts val="0"/>
-              </a:spcBef>
-            </a:pPr>
-            <a:endParaRPr lang="fr-FR" dirty="0"/>
-          </a:p>
-          <a:p>
-            <a:pPr hangingPunct="0">
-              <a:spcBef>
-                <a:spcPts val="0"/>
-              </a:spcBef>
-            </a:pPr>
-            <a:r>
-              <a:rPr lang="fr-FR" dirty="0"/>
-              <a:t>Créer une surface pour la zone de verdure autour du point 32 UMV 15450 07250 et la découper de la surface du camp</a:t>
+            <a:r>
+              <a:rPr lang="fr-FR" dirty="0" smtClean="0"/>
+              <a:t>Tracer une FLOT entre </a:t>
+            </a:r>
+            <a:r>
+              <a:rPr lang="fr-FR" b="1" dirty="0" err="1" smtClean="0"/>
+              <a:t>Printzheim</a:t>
+            </a:r>
+            <a:r>
+              <a:rPr lang="fr-FR" dirty="0" smtClean="0"/>
+              <a:t> et ce territoire ENI</a:t>
+            </a:r>
+          </a:p>
+          <a:p>
+            <a:pPr lvl="1"/>
+            <a:r>
+              <a:rPr lang="fr-FR" dirty="0" smtClean="0"/>
+              <a:t>Tirets jaunes, épaisseur de 3 pixels</a:t>
             </a:r>
           </a:p>
         </p:txBody>
@@ -15650,7 +16211,7 @@
     </p:spTree>
     <p:extLst>
       <p:ext uri="{BB962C8B-B14F-4D97-AF65-F5344CB8AC3E}">
-        <p14:creationId xmlns:p14="http://schemas.microsoft.com/office/powerpoint/2010/main" val="3559223914"/>
+        <p14:creationId xmlns:p14="http://schemas.microsoft.com/office/powerpoint/2010/main" val="3448961259"/>
       </p:ext>
     </p:extLst>
   </p:cSld>
@@ -15717,61 +16278,118 @@
           </a:bodyPr>
           <a:lstStyle/>
           <a:p>
-            <a:r>
-              <a:rPr lang="fr-FR" dirty="0" smtClean="0"/>
-              <a:t>Importer </a:t>
-            </a:r>
-            <a:r>
-              <a:rPr lang="fr-FR" b="1" dirty="0" err="1" smtClean="0"/>
-              <a:t>zones_emprises.shp</a:t>
-            </a:r>
-            <a:r>
-              <a:rPr lang="fr-FR" dirty="0" smtClean="0"/>
-              <a:t>. Affecter une couleur à chaque zone, selon l’attribut APPARTENANCE</a:t>
-            </a:r>
-          </a:p>
-          <a:p>
+            <a:pPr hangingPunct="0">
+              <a:spcBef>
+                <a:spcPts val="0"/>
+              </a:spcBef>
+            </a:pPr>
+            <a:r>
+              <a:rPr lang="fr-FR" dirty="0" smtClean="0"/>
+              <a:t>Dans </a:t>
+            </a:r>
+            <a:r>
+              <a:rPr lang="fr-FR" dirty="0"/>
+              <a:t>le secteur d’</a:t>
+            </a:r>
+            <a:r>
+              <a:rPr lang="fr-FR" i="1" dirty="0"/>
+              <a:t>Haguenau</a:t>
+            </a:r>
+            <a:r>
+              <a:rPr lang="fr-FR" dirty="0"/>
+              <a:t>, créer </a:t>
+            </a:r>
+            <a:r>
+              <a:rPr lang="fr-FR" dirty="0" smtClean="0"/>
+              <a:t>deux surfaces</a:t>
+            </a:r>
             <a:endParaRPr lang="fr-FR" dirty="0"/>
           </a:p>
           <a:p>
-            <a:r>
-              <a:rPr lang="fr-FR" dirty="0" smtClean="0"/>
-              <a:t>Fusionner les deux zones FDS pour ne former qu’une surface</a:t>
-            </a:r>
-          </a:p>
-          <a:p>
+            <a:pPr lvl="1" hangingPunct="0">
+              <a:spcBef>
+                <a:spcPts val="0"/>
+              </a:spcBef>
+            </a:pPr>
+            <a:r>
+              <a:rPr lang="fr-FR" dirty="0"/>
+              <a:t>Le camp </a:t>
+            </a:r>
+            <a:r>
+              <a:rPr lang="fr-FR" dirty="0" smtClean="0"/>
+              <a:t>d’</a:t>
+            </a:r>
+            <a:r>
+              <a:rPr lang="fr-FR" dirty="0" err="1" smtClean="0"/>
+              <a:t>Oberhoffen</a:t>
+            </a:r>
+            <a:r>
+              <a:rPr lang="fr-FR" dirty="0" smtClean="0"/>
+              <a:t> (zone de manœuvre)</a:t>
+            </a:r>
             <a:endParaRPr lang="fr-FR" dirty="0"/>
           </a:p>
           <a:p>
-            <a:r>
-              <a:rPr lang="fr-FR" dirty="0" smtClean="0"/>
-              <a:t>Créer un attribut « NOM_COURT » contenant les trois premières lettres de NAME</a:t>
-            </a:r>
-          </a:p>
-          <a:p>
-            <a:pPr lvl="1"/>
-            <a:r>
-              <a:rPr lang="fr-FR" dirty="0" smtClean="0"/>
-              <a:t>Modifier la couche pour que chaque </a:t>
-            </a:r>
-            <a:r>
-              <a:rPr lang="fr-FR" dirty="0" err="1" smtClean="0"/>
-              <a:t>feature</a:t>
-            </a:r>
-            <a:r>
-              <a:rPr lang="fr-FR" dirty="0" smtClean="0"/>
-              <a:t> affiche l’attribut NOM_COURT</a:t>
-            </a:r>
-          </a:p>
-          <a:p>
+            <a:pPr lvl="1" hangingPunct="0">
+              <a:spcBef>
+                <a:spcPts val="0"/>
+              </a:spcBef>
+            </a:pPr>
+            <a:r>
+              <a:rPr lang="fr-FR" dirty="0"/>
+              <a:t>Le quartier </a:t>
+            </a:r>
+            <a:r>
+              <a:rPr lang="fr-FR" dirty="0" smtClean="0"/>
+              <a:t>Estienne (bâtiments)</a:t>
+            </a:r>
             <a:endParaRPr lang="fr-FR" dirty="0"/>
+          </a:p>
+          <a:p>
+            <a:pPr marL="0" indent="0" hangingPunct="0">
+              <a:spcBef>
+                <a:spcPts val="0"/>
+              </a:spcBef>
+              <a:buNone/>
+            </a:pPr>
+            <a:endParaRPr lang="fr-FR" dirty="0"/>
+          </a:p>
+          <a:p>
+            <a:pPr hangingPunct="0">
+              <a:spcBef>
+                <a:spcPts val="0"/>
+              </a:spcBef>
+            </a:pPr>
+            <a:r>
+              <a:rPr lang="fr-FR" dirty="0" smtClean="0"/>
+              <a:t>Fusionner les deux zones</a:t>
+            </a:r>
+          </a:p>
+          <a:p>
+            <a:pPr hangingPunct="0">
+              <a:spcBef>
+                <a:spcPts val="0"/>
+              </a:spcBef>
+            </a:pPr>
+            <a:endParaRPr lang="fr-FR" dirty="0"/>
+          </a:p>
+          <a:p>
+            <a:pPr hangingPunct="0">
+              <a:spcBef>
+                <a:spcPts val="0"/>
+              </a:spcBef>
+            </a:pPr>
+            <a:r>
+              <a:rPr lang="fr-FR" dirty="0"/>
+              <a:t>Créer une surface pour la zone de verdure autour du point 32 UMV 15450 07250 et la découper de la surface du camp</a:t>
+            </a:r>
           </a:p>
         </p:txBody>
       </p:sp>
     </p:spTree>
     <p:extLst>
       <p:ext uri="{BB962C8B-B14F-4D97-AF65-F5344CB8AC3E}">
-        <p14:creationId xmlns:p14="http://schemas.microsoft.com/office/powerpoint/2010/main" val="2551274594"/>
+        <p14:creationId xmlns:p14="http://schemas.microsoft.com/office/powerpoint/2010/main" val="3559223914"/>
       </p:ext>
     </p:extLst>
   </p:cSld>
@@ -15815,7 +16433,7 @@
           <a:p>
             <a:r>
               <a:rPr lang="fr-FR" dirty="0" smtClean="0"/>
-              <a:t>Exercice 6</a:t>
+              <a:t>Exercice 5</a:t>
             </a:r>
             <a:endParaRPr lang="fr-FR" dirty="0"/>
           </a:p>
@@ -15833,70 +16451,56 @@
         </p:nvSpPr>
         <p:spPr/>
         <p:txBody>
-          <a:bodyPr/>
+          <a:bodyPr>
+            <a:normAutofit/>
+          </a:bodyPr>
           <a:lstStyle/>
           <a:p>
             <a:r>
               <a:rPr lang="fr-FR" dirty="0" smtClean="0"/>
-              <a:t>Configuration</a:t>
+              <a:t>Importer </a:t>
+            </a:r>
+            <a:r>
+              <a:rPr lang="fr-FR" b="1" dirty="0" err="1" smtClean="0"/>
+              <a:t>zones_emprises.shp</a:t>
+            </a:r>
+            <a:r>
+              <a:rPr lang="fr-FR" dirty="0" smtClean="0"/>
+              <a:t>. Affecter une couleur à chaque zone, selon l’attribut APPARTENANCE</a:t>
+            </a:r>
+          </a:p>
+          <a:p>
+            <a:endParaRPr lang="fr-FR" dirty="0"/>
+          </a:p>
+          <a:p>
+            <a:r>
+              <a:rPr lang="fr-FR" dirty="0" smtClean="0"/>
+              <a:t>Fusionner les deux zones FDS pour ne former qu’une surface</a:t>
+            </a:r>
+          </a:p>
+          <a:p>
+            <a:endParaRPr lang="fr-FR" dirty="0"/>
+          </a:p>
+          <a:p>
+            <a:r>
+              <a:rPr lang="fr-FR" dirty="0" smtClean="0"/>
+              <a:t>Créer un attribut « NOM_COURT » contenant les trois premières lettres de NAME</a:t>
             </a:r>
           </a:p>
           <a:p>
             <a:pPr lvl="1"/>
             <a:r>
               <a:rPr lang="fr-FR" dirty="0" smtClean="0"/>
-              <a:t>Afficher </a:t>
-            </a:r>
-            <a:r>
-              <a:rPr lang="fr-FR" dirty="0"/>
-              <a:t>le </a:t>
-            </a:r>
-            <a:r>
-              <a:rPr lang="fr-FR" dirty="0" smtClean="0"/>
-              <a:t>carroyage</a:t>
-            </a:r>
-          </a:p>
-          <a:p>
-            <a:pPr lvl="1"/>
-            <a:r>
-              <a:rPr lang="fr-FR" dirty="0" smtClean="0"/>
-              <a:t>Afficher le nord</a:t>
-            </a:r>
-          </a:p>
-          <a:p>
-            <a:pPr lvl="1"/>
-            <a:r>
-              <a:rPr lang="fr-FR" dirty="0" smtClean="0"/>
-              <a:t>Afficher les coordonnées en DMS</a:t>
-            </a:r>
-          </a:p>
-          <a:p>
-            <a:pPr lvl="1"/>
-            <a:endParaRPr lang="fr-FR" dirty="0"/>
-          </a:p>
-          <a:p>
-            <a:r>
-              <a:rPr lang="fr-FR" dirty="0"/>
-              <a:t>Créer un </a:t>
-            </a:r>
-            <a:r>
-              <a:rPr lang="fr-FR" dirty="0" smtClean="0"/>
-              <a:t>catalogue contenant le dossier DTED</a:t>
-            </a:r>
-          </a:p>
-          <a:p>
-            <a:endParaRPr lang="fr-FR" dirty="0" smtClean="0"/>
-          </a:p>
-          <a:p>
-            <a:r>
-              <a:rPr lang="fr-FR" dirty="0"/>
-              <a:t>Ajouter les données élévations à la couche </a:t>
-            </a:r>
-            <a:r>
-              <a:rPr lang="fr-FR" b="1" dirty="0" err="1" smtClean="0"/>
-              <a:t>villes_ouest.kmz</a:t>
-            </a:r>
-            <a:endParaRPr lang="fr-FR" b="1" dirty="0"/>
+              <a:t>Modifier la couche pour que chaque </a:t>
+            </a:r>
+            <a:r>
+              <a:rPr lang="fr-FR" dirty="0" err="1" smtClean="0"/>
+              <a:t>feature</a:t>
+            </a:r>
+            <a:r>
+              <a:rPr lang="fr-FR" dirty="0" smtClean="0"/>
+              <a:t> affiche l’attribut NOM_COURT</a:t>
+            </a:r>
           </a:p>
           <a:p>
             <a:endParaRPr lang="fr-FR" dirty="0"/>
@@ -15906,7 +16510,7 @@
     </p:spTree>
     <p:extLst>
       <p:ext uri="{BB962C8B-B14F-4D97-AF65-F5344CB8AC3E}">
-        <p14:creationId xmlns:p14="http://schemas.microsoft.com/office/powerpoint/2010/main" val="3862032269"/>
+        <p14:creationId xmlns:p14="http://schemas.microsoft.com/office/powerpoint/2010/main" val="2551274594"/>
       </p:ext>
     </p:extLst>
   </p:cSld>
@@ -15968,14 +16572,55 @@
         </p:nvSpPr>
         <p:spPr/>
         <p:txBody>
-          <a:bodyPr>
-            <a:normAutofit/>
-          </a:bodyPr>
+          <a:bodyPr/>
           <a:lstStyle/>
           <a:p>
             <a:r>
               <a:rPr lang="fr-FR" dirty="0" smtClean="0"/>
-              <a:t>Faire une recherche pour n’afficher que les localités située à plus de 270m d’altitude</a:t>
+              <a:t>Configuration</a:t>
+            </a:r>
+          </a:p>
+          <a:p>
+            <a:pPr lvl="1"/>
+            <a:r>
+              <a:rPr lang="fr-FR" dirty="0" smtClean="0"/>
+              <a:t>Afficher </a:t>
+            </a:r>
+            <a:r>
+              <a:rPr lang="fr-FR" dirty="0"/>
+              <a:t>le </a:t>
+            </a:r>
+            <a:r>
+              <a:rPr lang="fr-FR" dirty="0" smtClean="0"/>
+              <a:t>carroyage</a:t>
+            </a:r>
+          </a:p>
+          <a:p>
+            <a:pPr lvl="1"/>
+            <a:r>
+              <a:rPr lang="fr-FR" dirty="0" smtClean="0"/>
+              <a:t>Afficher le nord</a:t>
+            </a:r>
+          </a:p>
+          <a:p>
+            <a:pPr lvl="1"/>
+            <a:r>
+              <a:rPr lang="fr-FR" dirty="0" smtClean="0"/>
+              <a:t>Afficher les coordonnées en DMS</a:t>
+            </a:r>
+          </a:p>
+          <a:p>
+            <a:pPr lvl="1"/>
+            <a:endParaRPr lang="fr-FR" dirty="0"/>
+          </a:p>
+          <a:p>
+            <a:r>
+              <a:rPr lang="fr-FR" dirty="0"/>
+              <a:t>Créer un </a:t>
+            </a:r>
+            <a:r>
+              <a:rPr lang="fr-FR" dirty="0" smtClean="0"/>
+              <a:t>catalogue contenant le dossier DTED</a:t>
             </a:r>
           </a:p>
           <a:p>
@@ -15983,26 +16628,14 @@
           </a:p>
           <a:p>
             <a:r>
-              <a:rPr lang="fr-FR" dirty="0" smtClean="0"/>
-              <a:t>Calculer l’</a:t>
-            </a:r>
-            <a:r>
-              <a:rPr lang="fr-FR" dirty="0" err="1" smtClean="0"/>
-              <a:t>intervisibilité</a:t>
-            </a:r>
-            <a:r>
-              <a:rPr lang="fr-FR" dirty="0" smtClean="0"/>
-              <a:t> à partir des localités résultantes</a:t>
-            </a:r>
-          </a:p>
-          <a:p>
-            <a:endParaRPr lang="fr-FR" dirty="0"/>
-          </a:p>
-          <a:p>
-            <a:r>
               <a:rPr lang="fr-FR" dirty="0"/>
-              <a:t>Créer une carte des pentes</a:t>
-            </a:r>
+              <a:t>Ajouter les données élévations à la couche </a:t>
+            </a:r>
+            <a:r>
+              <a:rPr lang="fr-FR" b="1" dirty="0" err="1" smtClean="0"/>
+              <a:t>villes_ouest.kmz</a:t>
+            </a:r>
+            <a:endParaRPr lang="fr-FR" b="1" dirty="0"/>
           </a:p>
           <a:p>
             <a:endParaRPr lang="fr-FR" dirty="0"/>
@@ -16012,7 +16645,7 @@
     </p:spTree>
     <p:extLst>
       <p:ext uri="{BB962C8B-B14F-4D97-AF65-F5344CB8AC3E}">
-        <p14:creationId xmlns:p14="http://schemas.microsoft.com/office/powerpoint/2010/main" val="2373127748"/>
+        <p14:creationId xmlns:p14="http://schemas.microsoft.com/office/powerpoint/2010/main" val="3862032269"/>
       </p:ext>
     </p:extLst>
   </p:cSld>
@@ -16056,7 +16689,7 @@
           <a:p>
             <a:r>
               <a:rPr lang="fr-FR" dirty="0" smtClean="0"/>
-              <a:t>Exercice 7</a:t>
+              <a:t>Exercice 6</a:t>
             </a:r>
             <a:endParaRPr lang="fr-FR" dirty="0"/>
           </a:p>
@@ -16080,61 +16713,35 @@
           <a:lstStyle/>
           <a:p>
             <a:r>
+              <a:rPr lang="fr-FR" dirty="0" smtClean="0"/>
+              <a:t>Faire une recherche pour n’afficher que les localités située à plus de 270m d’altitude</a:t>
+            </a:r>
+          </a:p>
+          <a:p>
+            <a:endParaRPr lang="fr-FR" dirty="0" smtClean="0"/>
+          </a:p>
+          <a:p>
+            <a:r>
+              <a:rPr lang="fr-FR" dirty="0" smtClean="0"/>
+              <a:t>Calculer l’</a:t>
+            </a:r>
+            <a:r>
+              <a:rPr lang="fr-FR" dirty="0" err="1" smtClean="0"/>
+              <a:t>intervisibilité</a:t>
+            </a:r>
+            <a:r>
+              <a:rPr lang="fr-FR" dirty="0" smtClean="0"/>
+              <a:t> à partir des localités résultantes</a:t>
+            </a:r>
+          </a:p>
+          <a:p>
+            <a:endParaRPr lang="fr-FR" dirty="0"/>
+          </a:p>
+          <a:p>
+            <a:r>
               <a:rPr lang="fr-FR" dirty="0"/>
-              <a:t>Importer </a:t>
-            </a:r>
-            <a:r>
-              <a:rPr lang="fr-FR" b="1" dirty="0" smtClean="0"/>
-              <a:t>geonames_67.csv</a:t>
-            </a:r>
-          </a:p>
-          <a:p>
-            <a:endParaRPr lang="fr-FR" dirty="0"/>
-          </a:p>
-          <a:p>
-            <a:r>
-              <a:rPr lang="fr-FR" dirty="0" smtClean="0"/>
-              <a:t>Créer une carte de chaleur/grille de densité</a:t>
-            </a:r>
-          </a:p>
-          <a:p>
-            <a:endParaRPr lang="fr-FR" dirty="0" smtClean="0"/>
-          </a:p>
-          <a:p>
-            <a:r>
-              <a:rPr lang="fr-FR" dirty="0" smtClean="0"/>
-              <a:t>Créer une grille</a:t>
-            </a:r>
-          </a:p>
-          <a:p>
-            <a:pPr lvl="1"/>
-            <a:r>
-              <a:rPr lang="fr-FR" dirty="0" smtClean="0"/>
-              <a:t>Coin gauche situé sur </a:t>
-            </a:r>
-            <a:r>
-              <a:rPr lang="fr-FR" dirty="0" err="1" smtClean="0"/>
-              <a:t>Oberhausbergen</a:t>
-            </a:r>
-            <a:endParaRPr lang="fr-FR" dirty="0" smtClean="0"/>
-          </a:p>
-          <a:p>
-            <a:pPr lvl="1"/>
-            <a:r>
-              <a:rPr lang="fr-FR" dirty="0" smtClean="0"/>
-              <a:t>10 x 10 cases de 1km x 1km</a:t>
-            </a:r>
-          </a:p>
-          <a:p>
-            <a:pPr lvl="1"/>
-            <a:r>
-              <a:rPr lang="fr-FR" dirty="0" smtClean="0"/>
-              <a:t>Afficher pour chaque case le nombre de point contenus</a:t>
-            </a:r>
-          </a:p>
-          <a:p>
-            <a:pPr lvl="1"/>
-            <a:endParaRPr lang="fr-FR" dirty="0" smtClean="0"/>
+              <a:t>Créer une carte des pentes</a:t>
+            </a:r>
           </a:p>
           <a:p>
             <a:endParaRPr lang="fr-FR" dirty="0"/>
@@ -16144,7 +16751,7 @@
     </p:spTree>
     <p:extLst>
       <p:ext uri="{BB962C8B-B14F-4D97-AF65-F5344CB8AC3E}">
-        <p14:creationId xmlns:p14="http://schemas.microsoft.com/office/powerpoint/2010/main" val="3236756266"/>
+        <p14:creationId xmlns:p14="http://schemas.microsoft.com/office/powerpoint/2010/main" val="2373127748"/>
       </p:ext>
     </p:extLst>
   </p:cSld>
@@ -16213,10 +16820,10 @@
           <a:p>
             <a:r>
               <a:rPr lang="fr-FR" dirty="0"/>
-              <a:t>Créer une surface englobant les points de la couche </a:t>
-            </a:r>
-            <a:r>
-              <a:rPr lang="fr-FR" b="1" dirty="0"/>
+              <a:t>Importer </a:t>
+            </a:r>
+            <a:r>
+              <a:rPr lang="fr-FR" b="1" dirty="0" smtClean="0"/>
               <a:t>geonames_67.csv</a:t>
             </a:r>
           </a:p>
@@ -16225,33 +16832,48 @@
           </a:p>
           <a:p>
             <a:r>
-              <a:rPr lang="fr-FR" dirty="0"/>
-              <a:t>Créer un point central de cette zone</a:t>
-            </a:r>
-          </a:p>
-          <a:p>
-            <a:pPr marL="0" indent="0">
-              <a:buNone/>
-            </a:pPr>
-            <a:endParaRPr lang="fr-FR" dirty="0"/>
-          </a:p>
-          <a:p>
-            <a:r>
-              <a:rPr lang="fr-FR" dirty="0" smtClean="0"/>
-              <a:t>Trouver le point le plus haut de cette zone</a:t>
-            </a:r>
-          </a:p>
-          <a:p>
-            <a:endParaRPr lang="fr-FR" dirty="0"/>
-          </a:p>
-          <a:p>
-            <a:r>
-              <a:rPr lang="fr-FR" dirty="0" smtClean="0"/>
-              <a:t>Tampon autour du point central</a:t>
-            </a:r>
-          </a:p>
-          <a:p>
-            <a:endParaRPr lang="fr-FR" dirty="0"/>
+              <a:rPr lang="fr-FR" dirty="0" smtClean="0"/>
+              <a:t>Créer une carte de chaleur/grille de densité</a:t>
+            </a:r>
+          </a:p>
+          <a:p>
+            <a:endParaRPr lang="fr-FR" dirty="0" smtClean="0"/>
+          </a:p>
+          <a:p>
+            <a:r>
+              <a:rPr lang="fr-FR" dirty="0" smtClean="0"/>
+              <a:t>Créer une grille</a:t>
+            </a:r>
+          </a:p>
+          <a:p>
+            <a:pPr lvl="1"/>
+            <a:r>
+              <a:rPr lang="fr-FR" dirty="0" smtClean="0"/>
+              <a:t>Coin gauche situé sur </a:t>
+            </a:r>
+            <a:r>
+              <a:rPr lang="fr-FR" dirty="0" err="1" smtClean="0"/>
+              <a:t>Oberhausbergen</a:t>
+            </a:r>
+            <a:endParaRPr lang="fr-FR" dirty="0" smtClean="0"/>
+          </a:p>
+          <a:p>
+            <a:pPr lvl="1"/>
+            <a:r>
+              <a:rPr lang="fr-FR" dirty="0" smtClean="0"/>
+              <a:t>10 x 10 cases de 1km x 1km</a:t>
+            </a:r>
+          </a:p>
+          <a:p>
+            <a:pPr lvl="1"/>
+            <a:r>
+              <a:rPr lang="fr-FR" dirty="0" smtClean="0"/>
+              <a:t>Afficher pour chaque case le nombre de point contenus</a:t>
+            </a:r>
+          </a:p>
+          <a:p>
+            <a:pPr lvl="1"/>
+            <a:endParaRPr lang="fr-FR" dirty="0" smtClean="0"/>
           </a:p>
           <a:p>
             <a:endParaRPr lang="fr-FR" dirty="0"/>
@@ -16261,7 +16883,7 @@
     </p:spTree>
     <p:extLst>
       <p:ext uri="{BB962C8B-B14F-4D97-AF65-F5344CB8AC3E}">
-        <p14:creationId xmlns:p14="http://schemas.microsoft.com/office/powerpoint/2010/main" val="338508002"/>
+        <p14:creationId xmlns:p14="http://schemas.microsoft.com/office/powerpoint/2010/main" val="3236756266"/>
       </p:ext>
     </p:extLst>
   </p:cSld>
@@ -16274,11 +16896,6 @@
 <file path=ppt/slides/slide2.xml><?xml version="1.0" encoding="utf-8"?>
 <p:sld xmlns:a="http://schemas.openxmlformats.org/drawingml/2006/main" xmlns:r="http://schemas.openxmlformats.org/officeDocument/2006/relationships" xmlns:p="http://schemas.openxmlformats.org/presentationml/2006/main">
   <p:cSld>
-    <p:bg>
-      <p:bgRef idx="1001">
-        <a:schemeClr val="bg1"/>
-      </p:bgRef>
-    </p:bg>
     <p:spTree>
       <p:nvGrpSpPr>
         <p:cNvPr id="1" name=""/>
@@ -16300,7 +16917,7 @@
             <a:spLocks noGrp="1"/>
           </p:cNvSpPr>
           <p:nvPr>
-            <p:ph type="title"/>
+            <p:ph type="ctrTitle"/>
           </p:nvPr>
         </p:nvSpPr>
         <p:spPr/>
@@ -16310,7 +16927,7 @@
           <a:p>
             <a:r>
               <a:rPr lang="fr-FR" dirty="0" smtClean="0"/>
-              <a:t>Exercice 1</a:t>
+              <a:t>Global Mapper</a:t>
             </a:r>
             <a:endParaRPr lang="fr-FR" dirty="0"/>
           </a:p>
@@ -16318,78 +16935,36 @@
       </p:sp>
       <p:sp>
         <p:nvSpPr>
-          <p:cNvPr id="3" name="Espace réservé du contenu 2"/>
-          <p:cNvSpPr>
-            <a:spLocks noGrp="1"/>
-          </p:cNvSpPr>
-          <p:nvPr>
-            <p:ph idx="1"/>
+          <p:cNvPr id="3" name="Sous-titre 2"/>
+          <p:cNvSpPr>
+            <a:spLocks noGrp="1"/>
+          </p:cNvSpPr>
+          <p:nvPr>
+            <p:ph type="subTitle" idx="1"/>
           </p:nvPr>
         </p:nvSpPr>
         <p:spPr/>
         <p:txBody>
-          <a:bodyPr>
-            <a:normAutofit/>
-          </a:bodyPr>
+          <a:bodyPr/>
           <a:lstStyle/>
           <a:p>
             <a:r>
               <a:rPr lang="fr-FR" dirty="0" smtClean="0"/>
-              <a:t>Importer les fichiers </a:t>
-            </a:r>
-            <a:r>
-              <a:rPr lang="fr-FR" b="1" dirty="0" smtClean="0"/>
-              <a:t>CARTO/BDORTHO/*.ECW</a:t>
-            </a:r>
-          </a:p>
-          <a:p>
-            <a:endParaRPr lang="fr-FR" dirty="0" smtClean="0"/>
-          </a:p>
-          <a:p>
-            <a:r>
-              <a:rPr lang="fr-FR" dirty="0" smtClean="0"/>
-              <a:t>Importer tout le dossier </a:t>
-            </a:r>
-            <a:r>
-              <a:rPr lang="fr-FR" b="1" dirty="0" smtClean="0"/>
-              <a:t>CARTO/DTED</a:t>
-            </a:r>
-            <a:endParaRPr lang="fr-FR" b="1" dirty="0"/>
-          </a:p>
-          <a:p>
-            <a:endParaRPr lang="fr-FR" dirty="0" smtClean="0"/>
-          </a:p>
-          <a:p>
-            <a:r>
-              <a:rPr lang="fr-FR" dirty="0"/>
-              <a:t>Importer </a:t>
-            </a:r>
-            <a:r>
-              <a:rPr lang="fr-FR" dirty="0" smtClean="0"/>
-              <a:t>le fichier </a:t>
-            </a:r>
-            <a:r>
-              <a:rPr lang="fr-FR" b="1" dirty="0" smtClean="0"/>
-              <a:t>SCAN/alsace2.tif</a:t>
-            </a:r>
-          </a:p>
-          <a:p>
-            <a:pPr marL="0" indent="0">
-              <a:buNone/>
-            </a:pPr>
-            <a:endParaRPr lang="fr-FR" dirty="0" smtClean="0"/>
+              <a:t>Exercices pratiques</a:t>
+            </a:r>
+            <a:endParaRPr lang="fr-FR" dirty="0"/>
           </a:p>
         </p:txBody>
       </p:sp>
     </p:spTree>
     <p:extLst>
       <p:ext uri="{BB962C8B-B14F-4D97-AF65-F5344CB8AC3E}">
-        <p14:creationId xmlns:p14="http://schemas.microsoft.com/office/powerpoint/2010/main" val="4068381604"/>
+        <p14:creationId xmlns:p14="http://schemas.microsoft.com/office/powerpoint/2010/main" val="4189460078"/>
       </p:ext>
     </p:extLst>
   </p:cSld>
   <p:clrMapOvr>
-    <a:overrideClrMapping bg1="lt1" tx1="dk1" bg2="lt2" tx2="dk2" accent1="accent1" accent2="accent2" accent3="accent3" accent4="accent4" accent5="accent5" accent6="accent6" hlink="hlink" folHlink="folHlink"/>
+    <a:masterClrMapping/>
   </p:clrMapOvr>
 </p:sld>
 </file>
@@ -16452,89 +17027,56 @@
           <a:lstStyle/>
           <a:p>
             <a:r>
-              <a:rPr lang="fr-FR" dirty="0" smtClean="0"/>
-              <a:t>Importer </a:t>
-            </a:r>
-            <a:r>
-              <a:rPr lang="fr-FR" b="1" dirty="0" smtClean="0"/>
-              <a:t>alsace-</a:t>
-            </a:r>
-            <a:r>
-              <a:rPr lang="fr-FR" b="1" dirty="0" err="1" smtClean="0"/>
-              <a:t>moselle.tif</a:t>
-            </a:r>
-            <a:r>
-              <a:rPr lang="fr-FR" dirty="0" smtClean="0"/>
-              <a:t>. </a:t>
-            </a:r>
-          </a:p>
-          <a:p>
-            <a:pPr lvl="1"/>
-            <a:r>
-              <a:rPr lang="fr-FR" dirty="0" smtClean="0"/>
-              <a:t>Importer </a:t>
-            </a:r>
-            <a:r>
-              <a:rPr lang="fr-FR" b="1" dirty="0" smtClean="0"/>
-              <a:t>lauterbourg.png</a:t>
-            </a:r>
-            <a:r>
-              <a:rPr lang="fr-FR" dirty="0" smtClean="0"/>
-              <a:t> et la géo-référencer.</a:t>
-            </a:r>
-          </a:p>
-          <a:p>
-            <a:pPr lvl="1"/>
-            <a:r>
-              <a:rPr lang="fr-FR" dirty="0" smtClean="0"/>
-              <a:t>Utiliser l’outil </a:t>
-            </a:r>
-            <a:r>
-              <a:rPr lang="fr-FR" b="1" dirty="0" smtClean="0"/>
-              <a:t>Image </a:t>
-            </a:r>
-            <a:r>
-              <a:rPr lang="fr-FR" b="1" dirty="0" err="1" smtClean="0"/>
-              <a:t>swipe</a:t>
-            </a:r>
-            <a:r>
-              <a:rPr lang="fr-FR" dirty="0" smtClean="0"/>
-              <a:t> pour vérifier la cohérence.</a:t>
-            </a:r>
-          </a:p>
-          <a:p>
-            <a:endParaRPr lang="fr-FR" dirty="0" smtClean="0"/>
-          </a:p>
-          <a:p>
-            <a:r>
-              <a:rPr lang="fr-FR" dirty="0" smtClean="0"/>
-              <a:t>Exporter la couche </a:t>
-            </a:r>
-            <a:r>
-              <a:rPr lang="fr-FR" b="1" dirty="0" smtClean="0"/>
-              <a:t>alsace-</a:t>
-            </a:r>
-            <a:r>
-              <a:rPr lang="fr-FR" b="1" dirty="0" err="1" smtClean="0"/>
-              <a:t>moselle.tif</a:t>
-            </a:r>
-            <a:r>
-              <a:rPr lang="fr-FR" dirty="0" smtClean="0"/>
-              <a:t> et ne garder que la zone entourant Lauterbourg.</a:t>
+              <a:rPr lang="fr-FR" dirty="0"/>
+              <a:t>Créer une surface englobant les points de la couche </a:t>
+            </a:r>
+            <a:r>
+              <a:rPr lang="fr-FR" b="1" dirty="0"/>
+              <a:t>geonames_67.csv</a:t>
+            </a:r>
+          </a:p>
+          <a:p>
+            <a:endParaRPr lang="fr-FR" dirty="0"/>
+          </a:p>
+          <a:p>
+            <a:r>
+              <a:rPr lang="fr-FR" dirty="0"/>
+              <a:t>Créer un point central de cette zone</a:t>
             </a:r>
           </a:p>
           <a:p>
             <a:pPr marL="0" indent="0">
               <a:buNone/>
             </a:pPr>
-            <a:endParaRPr lang="fr-FR" dirty="0" smtClean="0"/>
+            <a:endParaRPr lang="fr-FR" dirty="0"/>
+          </a:p>
+          <a:p>
+            <a:r>
+              <a:rPr lang="fr-FR" dirty="0" smtClean="0"/>
+              <a:t>Trouver le point le plus haut de cette zone</a:t>
+            </a:r>
+          </a:p>
+          <a:p>
+            <a:endParaRPr lang="fr-FR" dirty="0"/>
+          </a:p>
+          <a:p>
+            <a:r>
+              <a:rPr lang="fr-FR" dirty="0" smtClean="0"/>
+              <a:t>Tampon autour du point central</a:t>
+            </a:r>
+          </a:p>
+          <a:p>
+            <a:endParaRPr lang="fr-FR" dirty="0"/>
+          </a:p>
+          <a:p>
+            <a:endParaRPr lang="fr-FR" dirty="0"/>
           </a:p>
         </p:txBody>
       </p:sp>
     </p:spTree>
     <p:extLst>
       <p:ext uri="{BB962C8B-B14F-4D97-AF65-F5344CB8AC3E}">
-        <p14:creationId xmlns:p14="http://schemas.microsoft.com/office/powerpoint/2010/main" val="735760639"/>
+        <p14:creationId xmlns:p14="http://schemas.microsoft.com/office/powerpoint/2010/main" val="338508002"/>
       </p:ext>
     </p:extLst>
   </p:cSld>
@@ -16578,7 +17120,7 @@
           <a:p>
             <a:r>
               <a:rPr lang="fr-FR" dirty="0" smtClean="0"/>
-              <a:t>Exercice 8</a:t>
+              <a:t>Exercice 7</a:t>
             </a:r>
             <a:endParaRPr lang="fr-FR" dirty="0"/>
           </a:p>
@@ -16596,38 +17138,60 @@
         </p:nvSpPr>
         <p:spPr/>
         <p:txBody>
-          <a:bodyPr/>
+          <a:bodyPr>
+            <a:normAutofit/>
+          </a:bodyPr>
           <a:lstStyle/>
           <a:p>
             <a:r>
               <a:rPr lang="fr-FR" dirty="0" smtClean="0"/>
-              <a:t>Importer relais.csv</a:t>
-            </a:r>
-          </a:p>
-          <a:p>
-            <a:endParaRPr lang="fr-FR" dirty="0"/>
-          </a:p>
-          <a:p>
-            <a:r>
-              <a:rPr lang="fr-FR" dirty="0" smtClean="0"/>
-              <a:t>Effectuer une jointure avec relais_data.csv</a:t>
+              <a:t>Importer </a:t>
+            </a:r>
+            <a:r>
+              <a:rPr lang="fr-FR" b="1" dirty="0" smtClean="0"/>
+              <a:t>alsace-</a:t>
+            </a:r>
+            <a:r>
+              <a:rPr lang="fr-FR" b="1" dirty="0" err="1" smtClean="0"/>
+              <a:t>moselle.tif</a:t>
+            </a:r>
+            <a:r>
+              <a:rPr lang="fr-FR" dirty="0" smtClean="0"/>
+              <a:t>. </a:t>
             </a:r>
           </a:p>
           <a:p>
             <a:pPr lvl="1"/>
             <a:r>
               <a:rPr lang="fr-FR" dirty="0" smtClean="0"/>
-              <a:t>Sur l’attribut OBJECTID</a:t>
+              <a:t>Importer </a:t>
+            </a:r>
+            <a:r>
+              <a:rPr lang="fr-FR" b="1" dirty="0" smtClean="0"/>
+              <a:t>lauterbourg.png</a:t>
+            </a:r>
+            <a:r>
+              <a:rPr lang="fr-FR" dirty="0" smtClean="0"/>
+              <a:t> et la géo-référencer.</a:t>
             </a:r>
           </a:p>
           <a:p>
             <a:pPr lvl="1"/>
-            <a:endParaRPr lang="fr-FR" dirty="0"/>
-          </a:p>
-          <a:p>
-            <a:r>
-              <a:rPr lang="fr-FR" dirty="0" smtClean="0"/>
-              <a:t>Affecter le type « relais » aux points de la couches relais</a:t>
+            <a:r>
+              <a:rPr lang="fr-FR" dirty="0" smtClean="0"/>
+              <a:t>Utiliser l’outil </a:t>
+            </a:r>
+            <a:r>
+              <a:rPr lang="fr-FR" b="1" dirty="0" smtClean="0"/>
+              <a:t>Image </a:t>
+            </a:r>
+            <a:r>
+              <a:rPr lang="fr-FR" b="1" dirty="0" err="1" smtClean="0"/>
+              <a:t>swipe</a:t>
+            </a:r>
+            <a:r>
+              <a:rPr lang="fr-FR" dirty="0" smtClean="0"/>
+              <a:t> pour vérifier la cohérence.</a:t>
             </a:r>
           </a:p>
           <a:p>
@@ -16636,19 +17200,33 @@
           <a:p>
             <a:r>
               <a:rPr lang="fr-FR" dirty="0" smtClean="0"/>
-              <a:t>Générer une zone tampon autour de chaque relais</a:t>
-            </a:r>
-            <a:endParaRPr lang="fr-FR" dirty="0"/>
-          </a:p>
-          <a:p>
-            <a:endParaRPr lang="fr-FR" dirty="0"/>
+              <a:t>Exporter la couche </a:t>
+            </a:r>
+            <a:r>
+              <a:rPr lang="fr-FR" b="1" dirty="0" smtClean="0"/>
+              <a:t>alsace-</a:t>
+            </a:r>
+            <a:r>
+              <a:rPr lang="fr-FR" b="1" dirty="0" err="1" smtClean="0"/>
+              <a:t>moselle.tif</a:t>
+            </a:r>
+            <a:r>
+              <a:rPr lang="fr-FR" dirty="0" smtClean="0"/>
+              <a:t> et ne garder que la zone entourant Lauterbourg.</a:t>
+            </a:r>
+          </a:p>
+          <a:p>
+            <a:pPr marL="0" indent="0">
+              <a:buNone/>
+            </a:pPr>
+            <a:endParaRPr lang="fr-FR" dirty="0" smtClean="0"/>
           </a:p>
         </p:txBody>
       </p:sp>
     </p:spTree>
     <p:extLst>
       <p:ext uri="{BB962C8B-B14F-4D97-AF65-F5344CB8AC3E}">
-        <p14:creationId xmlns:p14="http://schemas.microsoft.com/office/powerpoint/2010/main" val="1675770178"/>
+        <p14:creationId xmlns:p14="http://schemas.microsoft.com/office/powerpoint/2010/main" val="735760639"/>
       </p:ext>
     </p:extLst>
   </p:cSld>
@@ -16677,7 +17255,7 @@
       </p:grpSpPr>
       <p:sp>
         <p:nvSpPr>
-          <p:cNvPr id="4" name="Titre 3"/>
+          <p:cNvPr id="2" name="Titre 1"/>
           <p:cNvSpPr>
             <a:spLocks noGrp="1"/>
           </p:cNvSpPr>
@@ -16715,56 +17293,46 @@
           <a:p>
             <a:r>
               <a:rPr lang="fr-FR" dirty="0" smtClean="0"/>
-              <a:t>Importer données </a:t>
-            </a:r>
-            <a:r>
-              <a:rPr lang="fr-FR" dirty="0" err="1" smtClean="0"/>
-              <a:t>printzheim</a:t>
-            </a:r>
+              <a:t>Importer relais.csv</a:t>
+            </a:r>
+          </a:p>
+          <a:p>
+            <a:endParaRPr lang="fr-FR" dirty="0"/>
+          </a:p>
+          <a:p>
+            <a:r>
+              <a:rPr lang="fr-FR" dirty="0" smtClean="0"/>
+              <a:t>Effectuer une jointure avec relais_data.csv</a:t>
+            </a:r>
+          </a:p>
+          <a:p>
+            <a:pPr lvl="1"/>
+            <a:r>
+              <a:rPr lang="fr-FR" dirty="0" smtClean="0"/>
+              <a:t>Sur l’attribut OBJECTID</a:t>
+            </a:r>
+          </a:p>
+          <a:p>
+            <a:pPr lvl="1"/>
+            <a:endParaRPr lang="fr-FR" dirty="0"/>
+          </a:p>
+          <a:p>
+            <a:r>
+              <a:rPr lang="fr-FR" dirty="0" smtClean="0"/>
+              <a:t>Affecter le type « relais » aux points de la couches relais</a:t>
+            </a:r>
+          </a:p>
+          <a:p>
             <a:endParaRPr lang="fr-FR" dirty="0" smtClean="0"/>
           </a:p>
           <a:p>
-            <a:pPr lvl="1"/>
-            <a:r>
-              <a:rPr lang="fr-FR" dirty="0" err="1" smtClean="0"/>
-              <a:t>Carto</a:t>
-            </a:r>
-            <a:endParaRPr lang="fr-FR" dirty="0" smtClean="0"/>
-          </a:p>
-          <a:p>
-            <a:pPr lvl="1"/>
-            <a:r>
-              <a:rPr lang="fr-FR" dirty="0" smtClean="0"/>
-              <a:t>Relief</a:t>
+            <a:r>
+              <a:rPr lang="fr-FR" dirty="0" smtClean="0"/>
+              <a:t>Générer une zone tampon autour de chaque relais</a:t>
             </a:r>
             <a:endParaRPr lang="fr-FR" dirty="0"/>
           </a:p>
           <a:p>
-            <a:endParaRPr lang="fr-FR" dirty="0" smtClean="0"/>
-          </a:p>
-          <a:p>
-            <a:r>
-              <a:rPr lang="fr-FR" dirty="0" smtClean="0"/>
-              <a:t>Chercher le point le plus haut de la zone</a:t>
-            </a:r>
-          </a:p>
-          <a:p>
-            <a:endParaRPr lang="fr-FR" dirty="0" smtClean="0"/>
-          </a:p>
-          <a:p>
-            <a:r>
-              <a:rPr lang="fr-FR" dirty="0" smtClean="0"/>
-              <a:t>Afficher à l’échelle 1:30000</a:t>
-            </a:r>
-          </a:p>
-          <a:p>
-            <a:endParaRPr lang="fr-FR" dirty="0"/>
-          </a:p>
-          <a:p>
-            <a:r>
-              <a:rPr lang="fr-FR" dirty="0" smtClean="0"/>
-              <a:t>Enregistrer une vue</a:t>
-            </a:r>
             <a:endParaRPr lang="fr-FR" dirty="0"/>
           </a:p>
         </p:txBody>
@@ -16772,7 +17340,7 @@
     </p:spTree>
     <p:extLst>
       <p:ext uri="{BB962C8B-B14F-4D97-AF65-F5344CB8AC3E}">
-        <p14:creationId xmlns:p14="http://schemas.microsoft.com/office/powerpoint/2010/main" val="1877121751"/>
+        <p14:creationId xmlns:p14="http://schemas.microsoft.com/office/powerpoint/2010/main" val="1675770178"/>
       </p:ext>
     </p:extLst>
   </p:cSld>
@@ -16801,7 +17369,7 @@
       </p:grpSpPr>
       <p:sp>
         <p:nvSpPr>
-          <p:cNvPr id="2" name="Titre 1"/>
+          <p:cNvPr id="4" name="Titre 3"/>
           <p:cNvSpPr>
             <a:spLocks noGrp="1"/>
           </p:cNvSpPr>
@@ -16816,7 +17384,7 @@
           <a:p>
             <a:r>
               <a:rPr lang="fr-FR" dirty="0" smtClean="0"/>
-              <a:t>Exercice 9</a:t>
+              <a:t>Exercice 8</a:t>
             </a:r>
             <a:endParaRPr lang="fr-FR" dirty="0"/>
           </a:p>
@@ -16839,16 +17407,46 @@
           <a:p>
             <a:r>
               <a:rPr lang="fr-FR" dirty="0" smtClean="0"/>
-              <a:t>Générer les lignes de crêtes</a:t>
-            </a:r>
-          </a:p>
-          <a:p>
+              <a:t>Importer données </a:t>
+            </a:r>
+            <a:r>
+              <a:rPr lang="fr-FR" dirty="0" err="1" smtClean="0"/>
+              <a:t>printzheim</a:t>
+            </a:r>
+            <a:endParaRPr lang="fr-FR" dirty="0" smtClean="0"/>
+          </a:p>
+          <a:p>
+            <a:pPr lvl="1"/>
+            <a:r>
+              <a:rPr lang="fr-FR" dirty="0" err="1" smtClean="0"/>
+              <a:t>Carto</a:t>
+            </a:r>
+            <a:endParaRPr lang="fr-FR" dirty="0" smtClean="0"/>
+          </a:p>
+          <a:p>
+            <a:pPr lvl="1"/>
+            <a:r>
+              <a:rPr lang="fr-FR" dirty="0" smtClean="0"/>
+              <a:t>Relief</a:t>
+            </a:r>
             <a:endParaRPr lang="fr-FR" dirty="0"/>
           </a:p>
           <a:p>
-            <a:r>
-              <a:rPr lang="fr-FR" dirty="0" smtClean="0"/>
-              <a:t>Générer les lignes de thalweg</a:t>
+            <a:endParaRPr lang="fr-FR" dirty="0" smtClean="0"/>
+          </a:p>
+          <a:p>
+            <a:r>
+              <a:rPr lang="fr-FR" dirty="0" smtClean="0"/>
+              <a:t>Chercher le point le plus haut de la zone</a:t>
+            </a:r>
+          </a:p>
+          <a:p>
+            <a:endParaRPr lang="fr-FR" dirty="0" smtClean="0"/>
+          </a:p>
+          <a:p>
+            <a:r>
+              <a:rPr lang="fr-FR" dirty="0" smtClean="0"/>
+              <a:t>Afficher à l’échelle 1:30000</a:t>
             </a:r>
           </a:p>
           <a:p>
@@ -16857,18 +17455,8 @@
           <a:p>
             <a:r>
               <a:rPr lang="fr-FR" dirty="0" smtClean="0"/>
-              <a:t>Importer Quartier </a:t>
-            </a:r>
-            <a:r>
-              <a:rPr lang="fr-FR" dirty="0" err="1" smtClean="0"/>
-              <a:t>Estienne.osm</a:t>
-            </a:r>
-            <a:endParaRPr lang="fr-FR" dirty="0" smtClean="0"/>
-          </a:p>
-          <a:p>
-            <a:endParaRPr lang="fr-FR" dirty="0"/>
-          </a:p>
-          <a:p>
+              <a:t>Enregistrer une vue</a:t>
+            </a:r>
             <a:endParaRPr lang="fr-FR" dirty="0"/>
           </a:p>
         </p:txBody>
@@ -16876,7 +17464,7 @@
     </p:spTree>
     <p:extLst>
       <p:ext uri="{BB962C8B-B14F-4D97-AF65-F5344CB8AC3E}">
-        <p14:creationId xmlns:p14="http://schemas.microsoft.com/office/powerpoint/2010/main" val="2091622215"/>
+        <p14:creationId xmlns:p14="http://schemas.microsoft.com/office/powerpoint/2010/main" val="1877121751"/>
       </p:ext>
     </p:extLst>
   </p:cSld>
@@ -16942,36 +17530,32 @@
           <a:lstStyle/>
           <a:p>
             <a:r>
-              <a:rPr lang="fr-FR" dirty="0"/>
-              <a:t>Importer </a:t>
-            </a:r>
-            <a:r>
-              <a:rPr lang="fr-FR" dirty="0" smtClean="0"/>
-              <a:t>fr_populatedplaces_p.txt</a:t>
-            </a:r>
-          </a:p>
-          <a:p>
+              <a:rPr lang="fr-FR" dirty="0" smtClean="0"/>
+              <a:t>Générer les lignes de crêtes</a:t>
+            </a:r>
+          </a:p>
+          <a:p>
+            <a:endParaRPr lang="fr-FR" dirty="0"/>
+          </a:p>
+          <a:p>
+            <a:r>
+              <a:rPr lang="fr-FR" dirty="0" smtClean="0"/>
+              <a:t>Générer les lignes de thalweg</a:t>
+            </a:r>
+          </a:p>
+          <a:p>
+            <a:endParaRPr lang="fr-FR" dirty="0"/>
+          </a:p>
+          <a:p>
+            <a:r>
+              <a:rPr lang="fr-FR" dirty="0" smtClean="0"/>
+              <a:t>Importer Quartier </a:t>
+            </a:r>
+            <a:r>
+              <a:rPr lang="fr-FR" dirty="0" err="1" smtClean="0"/>
+              <a:t>Estienne.osm</a:t>
+            </a:r>
             <a:endParaRPr lang="fr-FR" dirty="0" smtClean="0"/>
-          </a:p>
-          <a:p>
-            <a:r>
-              <a:rPr lang="fr-FR" dirty="0" smtClean="0"/>
-              <a:t>Sauvegarder les villes d’alsace dans un nouveau fichier</a:t>
-            </a:r>
-          </a:p>
-          <a:p>
-            <a:pPr lvl="1"/>
-            <a:r>
-              <a:rPr lang="fr-FR" dirty="0" smtClean="0"/>
-              <a:t>Importer région</a:t>
-            </a:r>
-          </a:p>
-          <a:p>
-            <a:pPr lvl="1"/>
-            <a:r>
-              <a:rPr lang="fr-FR" dirty="0" smtClean="0"/>
-              <a:t>Exporter selon contour</a:t>
-            </a:r>
           </a:p>
           <a:p>
             <a:endParaRPr lang="fr-FR" dirty="0"/>
@@ -16984,7 +17568,7 @@
     </p:spTree>
     <p:extLst>
       <p:ext uri="{BB962C8B-B14F-4D97-AF65-F5344CB8AC3E}">
-        <p14:creationId xmlns:p14="http://schemas.microsoft.com/office/powerpoint/2010/main" val="1102591644"/>
+        <p14:creationId xmlns:p14="http://schemas.microsoft.com/office/powerpoint/2010/main" val="2091622215"/>
       </p:ext>
     </p:extLst>
   </p:cSld>
@@ -16994,7 +17578,7 @@
 </p:sld>
 </file>
 
-<file path=ppt/slides/slide3.xml><?xml version="1.0" encoding="utf-8"?>
+<file path=ppt/slides/slide25.xml><?xml version="1.0" encoding="utf-8"?>
 <p:sld xmlns:a="http://schemas.openxmlformats.org/drawingml/2006/main" xmlns:r="http://schemas.openxmlformats.org/officeDocument/2006/relationships" xmlns:p="http://schemas.openxmlformats.org/presentationml/2006/main">
   <p:cSld>
     <p:spTree>
@@ -17028,7 +17612,7 @@
           <a:p>
             <a:r>
               <a:rPr lang="fr-FR" dirty="0" smtClean="0"/>
-              <a:t>Exercice 1</a:t>
+              <a:t>Exercice 9</a:t>
             </a:r>
             <a:endParaRPr lang="fr-FR" dirty="0"/>
           </a:p>
@@ -17046,88 +17630,390 @@
         </p:nvSpPr>
         <p:spPr/>
         <p:txBody>
-          <a:bodyPr>
-            <a:normAutofit/>
-          </a:bodyPr>
+          <a:bodyPr/>
           <a:lstStyle/>
           <a:p>
             <a:r>
               <a:rPr lang="fr-FR" dirty="0"/>
-              <a:t>Importer le vecteur </a:t>
-            </a:r>
-            <a:r>
-              <a:rPr lang="fr-FR" b="1" dirty="0" err="1"/>
-              <a:t>villes_alsace.kmz</a:t>
-            </a:r>
-            <a:endParaRPr lang="fr-FR" b="1" dirty="0"/>
+              <a:t>Importer </a:t>
+            </a:r>
+            <a:r>
+              <a:rPr lang="fr-FR" dirty="0" smtClean="0"/>
+              <a:t>fr_populatedplaces_p.txt</a:t>
+            </a:r>
+          </a:p>
+          <a:p>
+            <a:endParaRPr lang="fr-FR" dirty="0" smtClean="0"/>
+          </a:p>
+          <a:p>
+            <a:r>
+              <a:rPr lang="fr-FR" dirty="0" smtClean="0"/>
+              <a:t>Sauvegarder les villes d’alsace dans un nouveau fichier</a:t>
+            </a:r>
+          </a:p>
+          <a:p>
+            <a:pPr lvl="1"/>
+            <a:r>
+              <a:rPr lang="fr-FR" dirty="0" smtClean="0"/>
+              <a:t>Importer région</a:t>
+            </a:r>
+          </a:p>
+          <a:p>
+            <a:pPr lvl="1"/>
+            <a:r>
+              <a:rPr lang="fr-FR" dirty="0" smtClean="0"/>
+              <a:t>Exporter selon contour</a:t>
+            </a:r>
           </a:p>
           <a:p>
             <a:endParaRPr lang="fr-FR" dirty="0"/>
           </a:p>
           <a:p>
-            <a:r>
-              <a:rPr lang="fr-FR" dirty="0"/>
-              <a:t>Importer le vecteur </a:t>
-            </a:r>
-            <a:r>
-              <a:rPr lang="fr-FR" b="1" dirty="0" err="1" smtClean="0"/>
-              <a:t>villes_ouest.kmz</a:t>
-            </a:r>
-            <a:endParaRPr lang="fr-FR" b="1" dirty="0" smtClean="0"/>
-          </a:p>
-          <a:p>
-            <a:endParaRPr lang="fr-FR" b="1" dirty="0"/>
-          </a:p>
-          <a:p>
-            <a:r>
-              <a:rPr lang="fr-FR" dirty="0" smtClean="0"/>
-              <a:t>Centrer </a:t>
-            </a:r>
-            <a:r>
-              <a:rPr lang="fr-FR" dirty="0"/>
-              <a:t>la vue sur </a:t>
-            </a:r>
-            <a:r>
-              <a:rPr lang="pl-PL" dirty="0"/>
-              <a:t>32 U LV 54890 </a:t>
-            </a:r>
-            <a:r>
-              <a:rPr lang="pl-PL" dirty="0" smtClean="0"/>
-              <a:t>21021</a:t>
-            </a:r>
-            <a:endParaRPr lang="fr-FR" dirty="0" smtClean="0"/>
-          </a:p>
-          <a:p>
-            <a:pPr marL="0" indent="0">
-              <a:buNone/>
-            </a:pPr>
-            <a:endParaRPr lang="fr-FR" dirty="0" smtClean="0"/>
-          </a:p>
-          <a:p>
-            <a:r>
-              <a:rPr lang="fr-FR" dirty="0" smtClean="0"/>
-              <a:t>Enregistrer l’espace de travail « </a:t>
-            </a:r>
-            <a:r>
-              <a:rPr lang="fr-FR" b="1" dirty="0" err="1" smtClean="0"/>
-              <a:t>exo_base.gmw</a:t>
-            </a:r>
-            <a:r>
-              <a:rPr lang="fr-FR" dirty="0" smtClean="0"/>
-              <a:t> »</a:t>
-            </a:r>
+            <a:endParaRPr lang="fr-FR" dirty="0"/>
           </a:p>
         </p:txBody>
       </p:sp>
     </p:spTree>
     <p:extLst>
       <p:ext uri="{BB962C8B-B14F-4D97-AF65-F5344CB8AC3E}">
-        <p14:creationId xmlns:p14="http://schemas.microsoft.com/office/powerpoint/2010/main" val="4214700777"/>
+        <p14:creationId xmlns:p14="http://schemas.microsoft.com/office/powerpoint/2010/main" val="1102591644"/>
       </p:ext>
     </p:extLst>
   </p:cSld>
   <p:clrMapOvr>
     <a:masterClrMapping/>
+  </p:clrMapOvr>
+</p:sld>
+</file>
+
+<file path=ppt/slides/slide26.xml><?xml version="1.0" encoding="utf-8"?>
+<p:sld xmlns:a="http://schemas.openxmlformats.org/drawingml/2006/main" xmlns:r="http://schemas.openxmlformats.org/officeDocument/2006/relationships" xmlns:p="http://schemas.openxmlformats.org/presentationml/2006/main">
+  <p:cSld>
+    <p:spTree>
+      <p:nvGrpSpPr>
+        <p:cNvPr id="1" name=""/>
+        <p:cNvGrpSpPr/>
+        <p:nvPr/>
+      </p:nvGrpSpPr>
+      <p:grpSpPr>
+        <a:xfrm>
+          <a:off x="0" y="0"/>
+          <a:ext cx="0" cy="0"/>
+          <a:chOff x="0" y="0"/>
+          <a:chExt cx="0" cy="0"/>
+        </a:xfrm>
+      </p:grpSpPr>
+      <p:sp>
+        <p:nvSpPr>
+          <p:cNvPr id="2" name="Titre 1"/>
+          <p:cNvSpPr>
+            <a:spLocks noGrp="1"/>
+          </p:cNvSpPr>
+          <p:nvPr>
+            <p:ph type="title"/>
+          </p:nvPr>
+        </p:nvSpPr>
+        <p:spPr/>
+        <p:txBody>
+          <a:bodyPr/>
+          <a:lstStyle/>
+          <a:p>
+            <a:r>
+              <a:rPr lang="fr-FR" dirty="0" smtClean="0"/>
+              <a:t>Exercice 10</a:t>
+            </a:r>
+            <a:endParaRPr lang="fr-FR" dirty="0"/>
+          </a:p>
+        </p:txBody>
+      </p:sp>
+      <p:sp>
+        <p:nvSpPr>
+          <p:cNvPr id="3" name="Espace réservé du contenu 2"/>
+          <p:cNvSpPr>
+            <a:spLocks noGrp="1"/>
+          </p:cNvSpPr>
+          <p:nvPr>
+            <p:ph idx="1"/>
+          </p:nvPr>
+        </p:nvSpPr>
+        <p:spPr/>
+        <p:txBody>
+          <a:bodyPr/>
+          <a:lstStyle/>
+          <a:p>
+            <a:r>
+              <a:rPr lang="fr-FR" dirty="0" smtClean="0"/>
+              <a:t>Importer le vecteur trajets</a:t>
+            </a:r>
+          </a:p>
+          <a:p>
+            <a:endParaRPr lang="fr-FR" dirty="0"/>
+          </a:p>
+          <a:p>
+            <a:r>
+              <a:rPr lang="fr-FR" dirty="0" smtClean="0"/>
+              <a:t>Réaliser une étude de densité sur la couche trajets</a:t>
+            </a:r>
+          </a:p>
+          <a:p>
+            <a:endParaRPr lang="fr-FR" dirty="0"/>
+          </a:p>
+          <a:p>
+            <a:r>
+              <a:rPr lang="fr-FR" dirty="0" smtClean="0"/>
+              <a:t>Importer les relais</a:t>
+            </a:r>
+          </a:p>
+          <a:p>
+            <a:endParaRPr lang="fr-FR" dirty="0"/>
+          </a:p>
+          <a:p>
+            <a:r>
+              <a:rPr lang="fr-FR" dirty="0" smtClean="0"/>
+              <a:t>Réaliser un diagramme de </a:t>
+            </a:r>
+            <a:r>
+              <a:rPr lang="fr-FR" dirty="0" err="1" smtClean="0"/>
+              <a:t>Vornoi</a:t>
+            </a:r>
+            <a:r>
+              <a:rPr lang="fr-FR" dirty="0" smtClean="0"/>
+              <a:t>/</a:t>
+            </a:r>
+            <a:r>
+              <a:rPr lang="fr-FR" dirty="0" err="1" smtClean="0"/>
+              <a:t>Thiessen</a:t>
+            </a:r>
+            <a:r>
+              <a:rPr lang="fr-FR" dirty="0" smtClean="0"/>
+              <a:t> sur les relais</a:t>
+            </a:r>
+          </a:p>
+          <a:p>
+            <a:endParaRPr lang="fr-FR" dirty="0"/>
+          </a:p>
+          <a:p>
+            <a:endParaRPr lang="fr-FR" dirty="0"/>
+          </a:p>
+        </p:txBody>
+      </p:sp>
+    </p:spTree>
+    <p:extLst>
+      <p:ext uri="{BB962C8B-B14F-4D97-AF65-F5344CB8AC3E}">
+        <p14:creationId xmlns:p14="http://schemas.microsoft.com/office/powerpoint/2010/main" val="1507155692"/>
+      </p:ext>
+    </p:extLst>
+  </p:cSld>
+  <p:clrMapOvr>
+    <a:masterClrMapping/>
+  </p:clrMapOvr>
+</p:sld>
+</file>
+
+<file path=ppt/slides/slide27.xml><?xml version="1.0" encoding="utf-8"?>
+<p:sld xmlns:a="http://schemas.openxmlformats.org/drawingml/2006/main" xmlns:r="http://schemas.openxmlformats.org/officeDocument/2006/relationships" xmlns:p="http://schemas.openxmlformats.org/presentationml/2006/main">
+  <p:cSld>
+    <p:spTree>
+      <p:nvGrpSpPr>
+        <p:cNvPr id="1" name=""/>
+        <p:cNvGrpSpPr/>
+        <p:nvPr/>
+      </p:nvGrpSpPr>
+      <p:grpSpPr>
+        <a:xfrm>
+          <a:off x="0" y="0"/>
+          <a:ext cx="0" cy="0"/>
+          <a:chOff x="0" y="0"/>
+          <a:chExt cx="0" cy="0"/>
+        </a:xfrm>
+      </p:grpSpPr>
+      <p:sp>
+        <p:nvSpPr>
+          <p:cNvPr id="2" name="Titre 1"/>
+          <p:cNvSpPr>
+            <a:spLocks noGrp="1"/>
+          </p:cNvSpPr>
+          <p:nvPr>
+            <p:ph type="title"/>
+          </p:nvPr>
+        </p:nvSpPr>
+        <p:spPr/>
+        <p:txBody>
+          <a:bodyPr/>
+          <a:lstStyle/>
+          <a:p>
+            <a:r>
+              <a:rPr lang="fr-FR" dirty="0" smtClean="0"/>
+              <a:t>Exercice 10</a:t>
+            </a:r>
+            <a:endParaRPr lang="fr-FR" dirty="0"/>
+          </a:p>
+        </p:txBody>
+      </p:sp>
+      <p:sp>
+        <p:nvSpPr>
+          <p:cNvPr id="3" name="Espace réservé du contenu 2"/>
+          <p:cNvSpPr>
+            <a:spLocks noGrp="1"/>
+          </p:cNvSpPr>
+          <p:nvPr>
+            <p:ph idx="1"/>
+          </p:nvPr>
+        </p:nvSpPr>
+        <p:spPr/>
+        <p:txBody>
+          <a:bodyPr/>
+          <a:lstStyle/>
+          <a:p>
+            <a:r>
+              <a:rPr lang="fr-FR" dirty="0" smtClean="0"/>
+              <a:t>Importer la trace GPS</a:t>
+            </a:r>
+            <a:endParaRPr lang="fr-FR" dirty="0"/>
+          </a:p>
+          <a:p>
+            <a:endParaRPr lang="fr-FR" dirty="0" smtClean="0"/>
+          </a:p>
+          <a:p>
+            <a:r>
+              <a:rPr lang="fr-FR" dirty="0" smtClean="0"/>
+              <a:t>Transformer la suite de points en ligne</a:t>
+            </a:r>
+          </a:p>
+        </p:txBody>
+      </p:sp>
+    </p:spTree>
+    <p:extLst>
+      <p:ext uri="{BB962C8B-B14F-4D97-AF65-F5344CB8AC3E}">
+        <p14:creationId xmlns:p14="http://schemas.microsoft.com/office/powerpoint/2010/main" val="1595350903"/>
+      </p:ext>
+    </p:extLst>
+  </p:cSld>
+  <p:clrMapOvr>
+    <a:masterClrMapping/>
+  </p:clrMapOvr>
+</p:sld>
+</file>
+
+<file path=ppt/slides/slide3.xml><?xml version="1.0" encoding="utf-8"?>
+<p:sld xmlns:a="http://schemas.openxmlformats.org/drawingml/2006/main" xmlns:r="http://schemas.openxmlformats.org/officeDocument/2006/relationships" xmlns:p="http://schemas.openxmlformats.org/presentationml/2006/main">
+  <p:cSld>
+    <p:bg>
+      <p:bgRef idx="1001">
+        <a:schemeClr val="bg1"/>
+      </p:bgRef>
+    </p:bg>
+    <p:spTree>
+      <p:nvGrpSpPr>
+        <p:cNvPr id="1" name=""/>
+        <p:cNvGrpSpPr/>
+        <p:nvPr/>
+      </p:nvGrpSpPr>
+      <p:grpSpPr>
+        <a:xfrm>
+          <a:off x="0" y="0"/>
+          <a:ext cx="0" cy="0"/>
+          <a:chOff x="0" y="0"/>
+          <a:chExt cx="0" cy="0"/>
+        </a:xfrm>
+      </p:grpSpPr>
+      <p:sp>
+        <p:nvSpPr>
+          <p:cNvPr id="2" name="Titre 1"/>
+          <p:cNvSpPr>
+            <a:spLocks noGrp="1"/>
+          </p:cNvSpPr>
+          <p:nvPr>
+            <p:ph type="title"/>
+          </p:nvPr>
+        </p:nvSpPr>
+        <p:spPr/>
+        <p:txBody>
+          <a:bodyPr/>
+          <a:lstStyle/>
+          <a:p>
+            <a:r>
+              <a:rPr lang="fr-FR" dirty="0" smtClean="0"/>
+              <a:t>Exercice 1</a:t>
+            </a:r>
+            <a:endParaRPr lang="fr-FR" dirty="0"/>
+          </a:p>
+        </p:txBody>
+      </p:sp>
+      <p:sp>
+        <p:nvSpPr>
+          <p:cNvPr id="3" name="Espace réservé du contenu 2"/>
+          <p:cNvSpPr>
+            <a:spLocks noGrp="1"/>
+          </p:cNvSpPr>
+          <p:nvPr>
+            <p:ph idx="1"/>
+          </p:nvPr>
+        </p:nvSpPr>
+        <p:spPr/>
+        <p:txBody>
+          <a:bodyPr>
+            <a:normAutofit/>
+          </a:bodyPr>
+          <a:lstStyle/>
+          <a:p>
+            <a:r>
+              <a:rPr lang="fr-FR" dirty="0" smtClean="0"/>
+              <a:t>Importer les fichiers </a:t>
+            </a:r>
+            <a:r>
+              <a:rPr lang="fr-FR" b="1" dirty="0" smtClean="0"/>
+              <a:t>CARTO/BDORTHO/*.ECW</a:t>
+            </a:r>
+          </a:p>
+          <a:p>
+            <a:endParaRPr lang="fr-FR" dirty="0" smtClean="0"/>
+          </a:p>
+          <a:p>
+            <a:r>
+              <a:rPr lang="fr-FR" dirty="0" smtClean="0"/>
+              <a:t>Importer tout le dossier </a:t>
+            </a:r>
+            <a:r>
+              <a:rPr lang="fr-FR" b="1" dirty="0" smtClean="0"/>
+              <a:t>CARTO/DTED</a:t>
+            </a:r>
+            <a:endParaRPr lang="fr-FR" b="1" dirty="0"/>
+          </a:p>
+          <a:p>
+            <a:endParaRPr lang="fr-FR" dirty="0" smtClean="0"/>
+          </a:p>
+          <a:p>
+            <a:r>
+              <a:rPr lang="fr-FR" dirty="0"/>
+              <a:t>Importer </a:t>
+            </a:r>
+            <a:r>
+              <a:rPr lang="fr-FR" dirty="0" smtClean="0"/>
+              <a:t>le fichier </a:t>
+            </a:r>
+            <a:r>
+              <a:rPr lang="fr-FR" b="1" dirty="0" smtClean="0"/>
+              <a:t>SCAN/alsace2.tif</a:t>
+            </a:r>
+          </a:p>
+          <a:p>
+            <a:pPr marL="0" indent="0">
+              <a:buNone/>
+            </a:pPr>
+            <a:endParaRPr lang="fr-FR" dirty="0" smtClean="0"/>
+          </a:p>
+        </p:txBody>
+      </p:sp>
+    </p:spTree>
+    <p:extLst>
+      <p:ext uri="{BB962C8B-B14F-4D97-AF65-F5344CB8AC3E}">
+        <p14:creationId xmlns:p14="http://schemas.microsoft.com/office/powerpoint/2010/main" val="4068381604"/>
+      </p:ext>
+    </p:extLst>
+  </p:cSld>
+  <p:clrMapOvr>
+    <a:overrideClrMapping bg1="lt1" tx1="dk1" bg2="lt2" tx2="dk2" accent1="accent1" accent2="accent2" accent3="accent3" accent4="accent4" accent5="accent5" accent6="accent6" hlink="hlink" folHlink="folHlink"/>
   </p:clrMapOvr>
 </p:sld>
 </file>
@@ -17191,102 +18077,76 @@
           <a:p>
             <a:r>
               <a:rPr lang="fr-FR" dirty="0"/>
-              <a:t>Tracer un </a:t>
-            </a:r>
-            <a:r>
-              <a:rPr lang="fr-FR" dirty="0" smtClean="0"/>
-              <a:t>itinéraire</a:t>
-            </a:r>
-          </a:p>
-          <a:p>
-            <a:pPr lvl="1"/>
-            <a:r>
-              <a:rPr lang="fr-FR" dirty="0" smtClean="0"/>
-              <a:t>Départ : </a:t>
-            </a:r>
-            <a:r>
-              <a:rPr lang="pl-PL" b="1" dirty="0"/>
-              <a:t>32ULV 54890 </a:t>
-            </a:r>
-            <a:r>
-              <a:rPr lang="pl-PL" b="1" dirty="0" smtClean="0"/>
+              <a:t>Importer le vecteur </a:t>
+            </a:r>
+            <a:r>
+              <a:rPr lang="fr-FR" b="1" dirty="0" err="1"/>
+              <a:t>villes_alsace.kmz</a:t>
+            </a:r>
+            <a:endParaRPr lang="fr-FR" b="1" dirty="0"/>
+          </a:p>
+          <a:p>
+            <a:endParaRPr lang="fr-FR" dirty="0"/>
+          </a:p>
+          <a:p>
+            <a:r>
+              <a:rPr lang="fr-FR" dirty="0"/>
+              <a:t>Importer le vecteur </a:t>
+            </a:r>
+            <a:r>
+              <a:rPr lang="fr-FR" b="1" dirty="0" err="1" smtClean="0"/>
+              <a:t>villes_ouest.kmz</a:t>
+            </a:r>
+            <a:endParaRPr lang="fr-FR" b="1" dirty="0" smtClean="0"/>
+          </a:p>
+          <a:p>
+            <a:endParaRPr lang="fr-FR" b="1" dirty="0"/>
+          </a:p>
+          <a:p>
+            <a:r>
+              <a:rPr lang="fr-FR" dirty="0" smtClean="0"/>
+              <a:t>Centrer </a:t>
+            </a:r>
+            <a:r>
+              <a:rPr lang="fr-FR" dirty="0"/>
+              <a:t>la vue sur </a:t>
+            </a:r>
+            <a:r>
+              <a:rPr lang="pl-PL" dirty="0"/>
+              <a:t>32 U LV 54890 </a:t>
+            </a:r>
+            <a:r>
+              <a:rPr lang="pl-PL" dirty="0" smtClean="0"/>
               <a:t>21021</a:t>
             </a:r>
-            <a:endParaRPr lang="fr-FR" b="1" dirty="0" smtClean="0"/>
-          </a:p>
-          <a:p>
-            <a:pPr lvl="1"/>
-            <a:r>
-              <a:rPr lang="fr-FR" dirty="0" smtClean="0"/>
-              <a:t>Arrivée : </a:t>
-            </a:r>
-            <a:r>
-              <a:rPr lang="pl-PL" b="1" dirty="0" smtClean="0"/>
-              <a:t>32ULV </a:t>
-            </a:r>
-            <a:r>
-              <a:rPr lang="pl-PL" b="1" dirty="0"/>
-              <a:t>53274 19025</a:t>
-            </a:r>
-            <a:endParaRPr lang="fr-FR" b="1" dirty="0"/>
-          </a:p>
-          <a:p>
-            <a:pPr lvl="1"/>
-            <a:r>
-              <a:rPr lang="fr-FR" dirty="0"/>
-              <a:t>Style : ligne en pointillé, rouge, épaisseur de </a:t>
-            </a:r>
-            <a:r>
-              <a:rPr lang="fr-FR" dirty="0" smtClean="0"/>
-              <a:t>3</a:t>
-            </a:r>
-          </a:p>
-          <a:p>
-            <a:pPr lvl="1"/>
-            <a:r>
-              <a:rPr lang="fr-FR" dirty="0" smtClean="0"/>
-              <a:t>Enregistrer dans une couche « itinéraire »</a:t>
-            </a:r>
-          </a:p>
-          <a:p>
-            <a:endParaRPr lang="fr-FR" dirty="0"/>
-          </a:p>
-          <a:p>
-            <a:r>
-              <a:rPr lang="fr-FR" dirty="0" smtClean="0"/>
-              <a:t>Ajouter un PPO sur chaque croisement rencontré</a:t>
-            </a:r>
-          </a:p>
-          <a:p>
             <a:endParaRPr lang="fr-FR" dirty="0" smtClean="0"/>
           </a:p>
           <a:p>
-            <a:r>
-              <a:rPr lang="fr-FR" dirty="0"/>
-              <a:t>Effectuer le </a:t>
-            </a:r>
-            <a:r>
-              <a:rPr lang="fr-FR" b="1" dirty="0"/>
-              <a:t>profil du tracé</a:t>
-            </a:r>
-            <a:r>
-              <a:rPr lang="fr-FR" dirty="0"/>
-              <a:t> sur cet itinéraire</a:t>
-            </a:r>
-          </a:p>
-          <a:p>
-            <a:pPr lvl="1"/>
-            <a:endParaRPr lang="fr-FR" dirty="0"/>
-          </a:p>
-          <a:p>
-            <a:endParaRPr lang="fr-FR" dirty="0"/>
+            <a:pPr marL="0" indent="0">
+              <a:buNone/>
+            </a:pPr>
+            <a:endParaRPr lang="fr-FR" dirty="0" smtClean="0"/>
+          </a:p>
+          <a:p>
+            <a:r>
+              <a:rPr lang="fr-FR" dirty="0" smtClean="0"/>
+              <a:t>Enregistrer l’espace de travail « </a:t>
+            </a:r>
+            <a:r>
+              <a:rPr lang="fr-FR" b="1" dirty="0" err="1" smtClean="0"/>
+              <a:t>exo_base.gmw</a:t>
+            </a:r>
+            <a:r>
+              <a:rPr lang="fr-FR" dirty="0" smtClean="0"/>
+              <a:t> »</a:t>
+            </a:r>
           </a:p>
         </p:txBody>
       </p:sp>
     </p:spTree>
     <p:extLst>
       <p:ext uri="{BB962C8B-B14F-4D97-AF65-F5344CB8AC3E}">
-        <p14:creationId xmlns:p14="http://schemas.microsoft.com/office/powerpoint/2010/main" val="3140496080"/>
+        <p14:creationId xmlns:p14="http://schemas.microsoft.com/office/powerpoint/2010/main" val="4214700777"/>
       </p:ext>
     </p:extLst>
   </p:cSld>
@@ -17354,6 +18214,170 @@
           <a:lstStyle/>
           <a:p>
             <a:r>
+              <a:rPr lang="fr-FR" dirty="0"/>
+              <a:t>Tracer un </a:t>
+            </a:r>
+            <a:r>
+              <a:rPr lang="fr-FR" dirty="0" smtClean="0"/>
+              <a:t>itinéraire</a:t>
+            </a:r>
+          </a:p>
+          <a:p>
+            <a:pPr lvl="1"/>
+            <a:r>
+              <a:rPr lang="fr-FR" dirty="0" smtClean="0"/>
+              <a:t>Départ : </a:t>
+            </a:r>
+            <a:r>
+              <a:rPr lang="pl-PL" b="1" dirty="0"/>
+              <a:t>32ULV 54890 </a:t>
+            </a:r>
+            <a:r>
+              <a:rPr lang="pl-PL" b="1" dirty="0" smtClean="0"/>
+              <a:t>21021</a:t>
+            </a:r>
+            <a:endParaRPr lang="fr-FR" b="1" dirty="0" smtClean="0"/>
+          </a:p>
+          <a:p>
+            <a:pPr lvl="1"/>
+            <a:r>
+              <a:rPr lang="fr-FR" dirty="0" smtClean="0"/>
+              <a:t>Arrivée : </a:t>
+            </a:r>
+            <a:r>
+              <a:rPr lang="pl-PL" b="1" dirty="0" smtClean="0"/>
+              <a:t>32ULV </a:t>
+            </a:r>
+            <a:r>
+              <a:rPr lang="pl-PL" b="1" dirty="0"/>
+              <a:t>53274 19025</a:t>
+            </a:r>
+            <a:endParaRPr lang="fr-FR" b="1" dirty="0"/>
+          </a:p>
+          <a:p>
+            <a:pPr lvl="1"/>
+            <a:r>
+              <a:rPr lang="fr-FR" dirty="0"/>
+              <a:t>Style : ligne en pointillé, rouge, épaisseur de </a:t>
+            </a:r>
+            <a:r>
+              <a:rPr lang="fr-FR" dirty="0" smtClean="0"/>
+              <a:t>3</a:t>
+            </a:r>
+          </a:p>
+          <a:p>
+            <a:pPr lvl="1"/>
+            <a:r>
+              <a:rPr lang="fr-FR" dirty="0" smtClean="0"/>
+              <a:t>Enregistrer dans une couche « itinéraire »</a:t>
+            </a:r>
+          </a:p>
+          <a:p>
+            <a:endParaRPr lang="fr-FR" dirty="0"/>
+          </a:p>
+          <a:p>
+            <a:r>
+              <a:rPr lang="fr-FR" dirty="0" smtClean="0"/>
+              <a:t>Ajouter un PPO sur chaque croisement rencontré</a:t>
+            </a:r>
+          </a:p>
+          <a:p>
+            <a:endParaRPr lang="fr-FR" dirty="0" smtClean="0"/>
+          </a:p>
+          <a:p>
+            <a:r>
+              <a:rPr lang="fr-FR" dirty="0"/>
+              <a:t>Effectuer le </a:t>
+            </a:r>
+            <a:r>
+              <a:rPr lang="fr-FR" b="1" dirty="0"/>
+              <a:t>profil du tracé</a:t>
+            </a:r>
+            <a:r>
+              <a:rPr lang="fr-FR" dirty="0"/>
+              <a:t> sur cet itinéraire</a:t>
+            </a:r>
+          </a:p>
+          <a:p>
+            <a:pPr lvl="1"/>
+            <a:endParaRPr lang="fr-FR" dirty="0"/>
+          </a:p>
+          <a:p>
+            <a:endParaRPr lang="fr-FR" dirty="0"/>
+          </a:p>
+        </p:txBody>
+      </p:sp>
+    </p:spTree>
+    <p:extLst>
+      <p:ext uri="{BB962C8B-B14F-4D97-AF65-F5344CB8AC3E}">
+        <p14:creationId xmlns:p14="http://schemas.microsoft.com/office/powerpoint/2010/main" val="3140496080"/>
+      </p:ext>
+    </p:extLst>
+  </p:cSld>
+  <p:clrMapOvr>
+    <a:masterClrMapping/>
+  </p:clrMapOvr>
+</p:sld>
+</file>
+
+<file path=ppt/slides/slide6.xml><?xml version="1.0" encoding="utf-8"?>
+<p:sld xmlns:a="http://schemas.openxmlformats.org/drawingml/2006/main" xmlns:r="http://schemas.openxmlformats.org/officeDocument/2006/relationships" xmlns:p="http://schemas.openxmlformats.org/presentationml/2006/main">
+  <p:cSld>
+    <p:spTree>
+      <p:nvGrpSpPr>
+        <p:cNvPr id="1" name=""/>
+        <p:cNvGrpSpPr/>
+        <p:nvPr/>
+      </p:nvGrpSpPr>
+      <p:grpSpPr>
+        <a:xfrm>
+          <a:off x="0" y="0"/>
+          <a:ext cx="0" cy="0"/>
+          <a:chOff x="0" y="0"/>
+          <a:chExt cx="0" cy="0"/>
+        </a:xfrm>
+      </p:grpSpPr>
+      <p:sp>
+        <p:nvSpPr>
+          <p:cNvPr id="2" name="Titre 1"/>
+          <p:cNvSpPr>
+            <a:spLocks noGrp="1"/>
+          </p:cNvSpPr>
+          <p:nvPr>
+            <p:ph type="title"/>
+          </p:nvPr>
+        </p:nvSpPr>
+        <p:spPr/>
+        <p:txBody>
+          <a:bodyPr/>
+          <a:lstStyle/>
+          <a:p>
+            <a:r>
+              <a:rPr lang="fr-FR" dirty="0" smtClean="0"/>
+              <a:t>Exercice 1</a:t>
+            </a:r>
+            <a:endParaRPr lang="fr-FR" dirty="0"/>
+          </a:p>
+        </p:txBody>
+      </p:sp>
+      <p:sp>
+        <p:nvSpPr>
+          <p:cNvPr id="3" name="Espace réservé du contenu 2"/>
+          <p:cNvSpPr>
+            <a:spLocks noGrp="1"/>
+          </p:cNvSpPr>
+          <p:nvPr>
+            <p:ph idx="1"/>
+          </p:nvPr>
+        </p:nvSpPr>
+        <p:spPr/>
+        <p:txBody>
+          <a:bodyPr>
+            <a:normAutofit/>
+          </a:bodyPr>
+          <a:lstStyle/>
+          <a:p>
+            <a:r>
               <a:rPr lang="fr-FR" dirty="0" smtClean="0"/>
               <a:t>Exporter l’itinéraire</a:t>
             </a:r>
@@ -17421,7 +18445,7 @@
 </p:sld>
 </file>
 
-<file path=ppt/slides/slide6.xml><?xml version="1.0" encoding="utf-8"?>
+<file path=ppt/slides/slide7.xml><?xml version="1.0" encoding="utf-8"?>
 <p:sld xmlns:a="http://schemas.openxmlformats.org/drawingml/2006/main" xmlns:r="http://schemas.openxmlformats.org/officeDocument/2006/relationships" xmlns:p="http://schemas.openxmlformats.org/presentationml/2006/main">
   <p:cSld>
     <p:spTree>
@@ -17844,141 +18868,6 @@
 </p:sld>
 </file>
 
-<file path=ppt/slides/slide7.xml><?xml version="1.0" encoding="utf-8"?>
-<p:sld xmlns:a="http://schemas.openxmlformats.org/drawingml/2006/main" xmlns:r="http://schemas.openxmlformats.org/officeDocument/2006/relationships" xmlns:p="http://schemas.openxmlformats.org/presentationml/2006/main">
-  <p:cSld>
-    <p:spTree>
-      <p:nvGrpSpPr>
-        <p:cNvPr id="1" name=""/>
-        <p:cNvGrpSpPr/>
-        <p:nvPr/>
-      </p:nvGrpSpPr>
-      <p:grpSpPr>
-        <a:xfrm>
-          <a:off x="0" y="0"/>
-          <a:ext cx="0" cy="0"/>
-          <a:chOff x="0" y="0"/>
-          <a:chExt cx="0" cy="0"/>
-        </a:xfrm>
-      </p:grpSpPr>
-      <p:sp>
-        <p:nvSpPr>
-          <p:cNvPr id="2" name="Titre 1"/>
-          <p:cNvSpPr>
-            <a:spLocks noGrp="1"/>
-          </p:cNvSpPr>
-          <p:nvPr>
-            <p:ph type="title"/>
-          </p:nvPr>
-        </p:nvSpPr>
-        <p:spPr/>
-        <p:txBody>
-          <a:bodyPr/>
-          <a:lstStyle/>
-          <a:p>
-            <a:r>
-              <a:rPr lang="fr-FR" dirty="0" smtClean="0"/>
-              <a:t>Exercice 2</a:t>
-            </a:r>
-            <a:endParaRPr lang="fr-FR" dirty="0"/>
-          </a:p>
-        </p:txBody>
-      </p:sp>
-      <p:sp>
-        <p:nvSpPr>
-          <p:cNvPr id="3" name="Espace réservé du contenu 2"/>
-          <p:cNvSpPr>
-            <a:spLocks noGrp="1"/>
-          </p:cNvSpPr>
-          <p:nvPr>
-            <p:ph idx="1"/>
-          </p:nvPr>
-        </p:nvSpPr>
-        <p:spPr/>
-        <p:txBody>
-          <a:bodyPr>
-            <a:normAutofit fontScale="92500" lnSpcReduction="10000"/>
-          </a:bodyPr>
-          <a:lstStyle/>
-          <a:p>
-            <a:r>
-              <a:rPr lang="fr-FR" dirty="0" smtClean="0"/>
-              <a:t>Dessiner une box autour de la zone mise en évidence</a:t>
-            </a:r>
-          </a:p>
-          <a:p>
-            <a:pPr lvl="1"/>
-            <a:r>
-              <a:rPr lang="fr-FR" dirty="0" smtClean="0"/>
-              <a:t>Définir le style intérieur en hachure rouge</a:t>
-            </a:r>
-          </a:p>
-          <a:p>
-            <a:pPr lvl="1"/>
-            <a:endParaRPr lang="fr-FR" dirty="0"/>
-          </a:p>
-          <a:p>
-            <a:r>
-              <a:rPr lang="fr-FR" dirty="0" smtClean="0"/>
-              <a:t>Aller en </a:t>
-            </a:r>
-            <a:r>
-              <a:rPr lang="pl-PL" dirty="0"/>
-              <a:t>32 U LV 54828 </a:t>
-            </a:r>
-            <a:r>
-              <a:rPr lang="pl-PL" dirty="0" smtClean="0"/>
-              <a:t>19723</a:t>
-            </a:r>
-            <a:endParaRPr lang="fr-FR" dirty="0" smtClean="0"/>
-          </a:p>
-          <a:p>
-            <a:endParaRPr lang="fr-FR" dirty="0"/>
-          </a:p>
-          <a:p>
-            <a:r>
-              <a:rPr lang="fr-FR" dirty="0" smtClean="0"/>
-              <a:t>Dessiner un polygone autour du bassin</a:t>
-            </a:r>
-          </a:p>
-          <a:p>
-            <a:endParaRPr lang="fr-FR" dirty="0"/>
-          </a:p>
-          <a:p>
-            <a:r>
-              <a:rPr lang="fr-FR" dirty="0" smtClean="0"/>
-              <a:t>Modifier le polygone pour inclure le carré boisé à l’est</a:t>
-            </a:r>
-          </a:p>
-          <a:p>
-            <a:endParaRPr lang="fr-FR" dirty="0" smtClean="0"/>
-          </a:p>
-          <a:p>
-            <a:r>
-              <a:rPr lang="fr-FR" dirty="0" smtClean="0"/>
-              <a:t>Enregistrer l’espace </a:t>
-            </a:r>
-            <a:r>
-              <a:rPr lang="fr-FR" b="1" dirty="0" smtClean="0"/>
-              <a:t>exo2.gmw</a:t>
-            </a:r>
-            <a:endParaRPr lang="fr-FR" dirty="0"/>
-          </a:p>
-        </p:txBody>
-      </p:sp>
-    </p:spTree>
-    <p:extLst>
-      <p:ext uri="{BB962C8B-B14F-4D97-AF65-F5344CB8AC3E}">
-        <p14:creationId xmlns:p14="http://schemas.microsoft.com/office/powerpoint/2010/main" val="1808507157"/>
-      </p:ext>
-    </p:extLst>
-  </p:cSld>
-  <p:clrMapOvr>
-    <a:masterClrMapping/>
-  </p:clrMapOvr>
-</p:sld>
-</file>
-
 <file path=ppt/slides/slide8.xml><?xml version="1.0" encoding="utf-8"?>
 <p:sld xmlns:a="http://schemas.openxmlformats.org/drawingml/2006/main" xmlns:r="http://schemas.openxmlformats.org/officeDocument/2006/relationships" xmlns:p="http://schemas.openxmlformats.org/presentationml/2006/main">
   <p:cSld>
@@ -18013,7 +18902,7 @@
           <a:p>
             <a:r>
               <a:rPr lang="fr-FR" dirty="0" smtClean="0"/>
-              <a:t>Exercice 3</a:t>
+              <a:t>Exercice 2</a:t>
             </a:r>
             <a:endParaRPr lang="fr-FR" dirty="0"/>
           </a:p>
@@ -18032,59 +18921,79 @@
         <p:spPr/>
         <p:txBody>
           <a:bodyPr>
-            <a:normAutofit/>
+            <a:normAutofit fontScale="92500" lnSpcReduction="10000"/>
           </a:bodyPr>
           <a:lstStyle/>
           <a:p>
             <a:r>
               <a:rPr lang="fr-FR" dirty="0" smtClean="0"/>
-              <a:t>Ouvrir </a:t>
-            </a:r>
-            <a:r>
-              <a:rPr lang="fr-FR" b="1" dirty="0" err="1" smtClean="0"/>
-              <a:t>exo_base.gmw</a:t>
-            </a:r>
-            <a:endParaRPr lang="fr-FR" b="1" dirty="0"/>
-          </a:p>
-          <a:p>
-            <a:pPr marL="0" indent="0">
-              <a:buNone/>
-            </a:pPr>
+              <a:t>Dessiner une box autour de la zone mise en évidence</a:t>
+            </a:r>
+          </a:p>
+          <a:p>
+            <a:pPr lvl="1"/>
+            <a:r>
+              <a:rPr lang="fr-FR" dirty="0" smtClean="0"/>
+              <a:t>Définir le style intérieur en hachure rouge</a:t>
+            </a:r>
+          </a:p>
+          <a:p>
+            <a:pPr lvl="1"/>
+            <a:endParaRPr lang="fr-FR" dirty="0"/>
+          </a:p>
+          <a:p>
+            <a:r>
+              <a:rPr lang="fr-FR" dirty="0" smtClean="0"/>
+              <a:t>Aller en </a:t>
+            </a:r>
+            <a:r>
+              <a:rPr lang="pl-PL" dirty="0"/>
+              <a:t>32 U LV 54828 </a:t>
+            </a:r>
+            <a:r>
+              <a:rPr lang="pl-PL" dirty="0" smtClean="0"/>
+              <a:t>19723</a:t>
+            </a:r>
             <a:endParaRPr lang="fr-FR" dirty="0" smtClean="0"/>
           </a:p>
           <a:p>
-            <a:r>
-              <a:rPr lang="fr-FR" dirty="0" smtClean="0"/>
-              <a:t>Utiliser l’outil recherche </a:t>
-            </a:r>
-            <a:r>
-              <a:rPr lang="fr-FR" dirty="0"/>
-              <a:t>pour localiser </a:t>
-            </a:r>
-            <a:r>
-              <a:rPr lang="fr-FR" dirty="0" err="1"/>
-              <a:t>Printzheim</a:t>
-            </a:r>
             <a:endParaRPr lang="fr-FR" dirty="0"/>
           </a:p>
           <a:p>
+            <a:r>
+              <a:rPr lang="fr-FR" dirty="0" smtClean="0"/>
+              <a:t>Dessiner un polygone autour du bassin</a:t>
+            </a:r>
+          </a:p>
+          <a:p>
+            <a:endParaRPr lang="fr-FR" dirty="0"/>
+          </a:p>
+          <a:p>
+            <a:r>
+              <a:rPr lang="fr-FR" dirty="0" smtClean="0"/>
+              <a:t>Modifier le polygone pour inclure le carré boisé à l’est</a:t>
+            </a:r>
+          </a:p>
+          <a:p>
             <a:endParaRPr lang="fr-FR" dirty="0" smtClean="0"/>
           </a:p>
           <a:p>
             <a:r>
-              <a:rPr lang="fr-FR" dirty="0"/>
-              <a:t>Zoomer à l’échelle 1:50000</a:t>
-            </a:r>
-          </a:p>
-          <a:p>
-            <a:endParaRPr lang="fr-FR" dirty="0" smtClean="0"/>
+              <a:rPr lang="fr-FR" dirty="0" smtClean="0"/>
+              <a:t>Enregistrer l’espace </a:t>
+            </a:r>
+            <a:r>
+              <a:rPr lang="fr-FR" b="1" dirty="0" smtClean="0"/>
+              <a:t>exo2.gmw</a:t>
+            </a:r>
+            <a:endParaRPr lang="fr-FR" dirty="0"/>
           </a:p>
         </p:txBody>
       </p:sp>
     </p:spTree>
     <p:extLst>
       <p:ext uri="{BB962C8B-B14F-4D97-AF65-F5344CB8AC3E}">
-        <p14:creationId xmlns:p14="http://schemas.microsoft.com/office/powerpoint/2010/main" val="4230654763"/>
+        <p14:creationId xmlns:p14="http://schemas.microsoft.com/office/powerpoint/2010/main" val="1808507157"/>
       </p:ext>
     </p:extLst>
   </p:cSld>
@@ -18153,98 +19062,53 @@
           <a:p>
             <a:r>
               <a:rPr lang="fr-FR" dirty="0" smtClean="0"/>
-              <a:t>Exporter la couche alsace2.tif</a:t>
-            </a:r>
-          </a:p>
-          <a:p>
-            <a:pPr lvl="1"/>
-            <a:r>
-              <a:rPr lang="fr-FR" dirty="0" smtClean="0"/>
-              <a:t>Format GEOTIFF</a:t>
-            </a:r>
-          </a:p>
-          <a:p>
-            <a:pPr lvl="1"/>
-            <a:r>
-              <a:rPr lang="fr-FR" dirty="0" smtClean="0"/>
-              <a:t>Exporter les données visibles à l’écran</a:t>
-            </a:r>
-          </a:p>
-          <a:p>
-            <a:pPr lvl="1"/>
-            <a:r>
-              <a:rPr lang="fr-FR" dirty="0" smtClean="0"/>
-              <a:t>Sous le nom « </a:t>
+              <a:t>Ouvrir </a:t>
             </a:r>
             <a:r>
               <a:rPr lang="fr-FR" b="1" dirty="0" err="1" smtClean="0"/>
-              <a:t>Printzheim.tif</a:t>
-            </a:r>
-            <a:r>
-              <a:rPr lang="fr-FR" dirty="0" smtClean="0"/>
-              <a:t> »</a:t>
-            </a:r>
-          </a:p>
-          <a:p>
-            <a:pPr lvl="1"/>
+              <a:t>exo_base.gmw</a:t>
+            </a:r>
+            <a:endParaRPr lang="fr-FR" b="1" dirty="0"/>
+          </a:p>
+          <a:p>
+            <a:pPr marL="0" indent="0">
+              <a:buNone/>
+            </a:pPr>
+            <a:endParaRPr lang="fr-FR" dirty="0" smtClean="0"/>
+          </a:p>
+          <a:p>
+            <a:r>
+              <a:rPr lang="fr-FR" dirty="0" smtClean="0"/>
+              <a:t>Utiliser l’outil recherche </a:t>
+            </a:r>
+            <a:r>
+              <a:rPr lang="fr-FR" dirty="0"/>
+              <a:t>pour localiser </a:t>
+            </a:r>
+            <a:r>
+              <a:rPr lang="fr-FR" dirty="0" err="1"/>
+              <a:t>Printzheim</a:t>
+            </a:r>
             <a:endParaRPr lang="fr-FR" dirty="0"/>
           </a:p>
           <a:p>
-            <a:r>
-              <a:rPr lang="fr-FR" dirty="0" smtClean="0"/>
-              <a:t>Répéter la procédure pour les données relief</a:t>
-            </a:r>
-          </a:p>
-          <a:p>
-            <a:pPr lvl="1"/>
-            <a:r>
-              <a:rPr lang="fr-FR" dirty="0" smtClean="0"/>
-              <a:t>Exporter vers </a:t>
-            </a:r>
-            <a:r>
-              <a:rPr lang="fr-FR" b="1" dirty="0" err="1" smtClean="0"/>
-              <a:t>Printzheim_relief.tif</a:t>
-            </a:r>
-            <a:endParaRPr lang="fr-FR" b="1" dirty="0" smtClean="0"/>
-          </a:p>
-          <a:p>
-            <a:pPr lvl="1"/>
-            <a:endParaRPr lang="fr-FR" b="1" dirty="0"/>
+            <a:endParaRPr lang="fr-FR" dirty="0" smtClean="0"/>
           </a:p>
           <a:p>
             <a:r>
               <a:rPr lang="fr-FR" dirty="0"/>
-              <a:t>Enregistrer l’espace de travail </a:t>
-            </a:r>
-            <a:r>
-              <a:rPr lang="fr-FR" b="1" dirty="0" smtClean="0"/>
-              <a:t>exo3.gmw</a:t>
-            </a:r>
-            <a:endParaRPr lang="fr-FR" dirty="0"/>
-          </a:p>
-          <a:p>
-            <a:pPr lvl="1"/>
-            <a:endParaRPr lang="fr-FR" b="1" dirty="0" smtClean="0"/>
-          </a:p>
-          <a:p>
-            <a:pPr lvl="1"/>
-            <a:endParaRPr lang="fr-FR" dirty="0"/>
+              <a:t>Zoomer à l’échelle 1:50000</a:t>
+            </a:r>
           </a:p>
           <a:p>
             <a:endParaRPr lang="fr-FR" dirty="0" smtClean="0"/>
-          </a:p>
-          <a:p>
-            <a:pPr marL="0" indent="0">
-              <a:buNone/>
-            </a:pPr>
-            <a:endParaRPr lang="fr-FR" dirty="0"/>
           </a:p>
         </p:txBody>
       </p:sp>
     </p:spTree>
     <p:extLst>
       <p:ext uri="{BB962C8B-B14F-4D97-AF65-F5344CB8AC3E}">
-        <p14:creationId xmlns:p14="http://schemas.microsoft.com/office/powerpoint/2010/main" val="3127763321"/>
+        <p14:creationId xmlns:p14="http://schemas.microsoft.com/office/powerpoint/2010/main" val="4230654763"/>
       </p:ext>
     </p:extLst>
   </p:cSld>

</xml_diff>